<commit_message>
Atualização materiais didáticos (01/08)
Atualizando os materiais didáticos do curso de Git/GitHub.
</commit_message>
<xml_diff>
--- a/Materiais didáticos/Apresentação - Curso de Git_GitHub.pptx
+++ b/Materiais didáticos/Apresentação - Curso de Git_GitHub.pptx
@@ -49,6 +49,13 @@
     <p:sldId id="294" r:id="rId44"/>
     <p:sldId id="295" r:id="rId45"/>
     <p:sldId id="296" r:id="rId46"/>
+    <p:sldId id="297" r:id="rId47"/>
+    <p:sldId id="298" r:id="rId48"/>
+    <p:sldId id="299" r:id="rId49"/>
+    <p:sldId id="300" r:id="rId50"/>
+    <p:sldId id="301" r:id="rId51"/>
+    <p:sldId id="302" r:id="rId52"/>
+    <p:sldId id="303" r:id="rId53"/>
   </p:sldIdLst>
   <p:sldSz cy="5143500" cx="9144000"/>
   <p:notesSz cx="6858000" cy="9144000"/>
@@ -3220,7 +3227,7 @@
       </p:grpSpPr>
       <p:sp>
         <p:nvSpPr>
-          <p:cNvPr id="373" name="Google Shape;373;g2504a21e5e6_0_5:notes"/>
+          <p:cNvPr id="373" name="Google Shape;373;g1e50f0a7202_0_0:notes"/>
           <p:cNvSpPr/>
           <p:nvPr>
             <p:ph idx="2" type="sldImg"/>
@@ -3255,7 +3262,7 @@
       </p:sp>
       <p:sp>
         <p:nvSpPr>
-          <p:cNvPr id="374" name="Google Shape;374;g2504a21e5e6_0_5:notes"/>
+          <p:cNvPr id="374" name="Google Shape;374;g1e50f0a7202_0_0:notes"/>
           <p:cNvSpPr txBox="1"/>
           <p:nvPr>
             <p:ph idx="1" type="body"/>
@@ -3319,7 +3326,7 @@
       </p:grpSpPr>
       <p:sp>
         <p:nvSpPr>
-          <p:cNvPr id="382" name="Google Shape;382;g1e444f14275_0_0:notes"/>
+          <p:cNvPr id="382" name="Google Shape;382;g1e50f0a7202_0_10:notes"/>
           <p:cNvSpPr/>
           <p:nvPr>
             <p:ph idx="2" type="sldImg"/>
@@ -3354,7 +3361,7 @@
       </p:sp>
       <p:sp>
         <p:nvSpPr>
-          <p:cNvPr id="383" name="Google Shape;383;g1e444f14275_0_0:notes"/>
+          <p:cNvPr id="383" name="Google Shape;383;g1e50f0a7202_0_10:notes"/>
           <p:cNvSpPr txBox="1"/>
           <p:nvPr>
             <p:ph idx="1" type="body"/>
@@ -3404,7 +3411,7 @@
   <p:cSld>
     <p:spTree>
       <p:nvGrpSpPr>
-        <p:cNvPr id="392" name="Shape 392"/>
+        <p:cNvPr id="390" name="Shape 390"/>
         <p:cNvGrpSpPr/>
         <p:nvPr/>
       </p:nvGrpSpPr>
@@ -3418,7 +3425,7 @@
       </p:grpSpPr>
       <p:sp>
         <p:nvSpPr>
-          <p:cNvPr id="393" name="Google Shape;393;g1e444f14275_0_8:notes"/>
+          <p:cNvPr id="391" name="Google Shape;391;g1e50f0a7202_0_19:notes"/>
           <p:cNvSpPr/>
           <p:nvPr>
             <p:ph idx="2" type="sldImg"/>
@@ -3453,7 +3460,7 @@
       </p:sp>
       <p:sp>
         <p:nvSpPr>
-          <p:cNvPr id="394" name="Google Shape;394;g1e444f14275_0_8:notes"/>
+          <p:cNvPr id="392" name="Google Shape;392;g1e50f0a7202_0_19:notes"/>
           <p:cNvSpPr txBox="1"/>
           <p:nvPr>
             <p:ph idx="1" type="body"/>
@@ -3503,7 +3510,7 @@
   <p:cSld>
     <p:spTree>
       <p:nvGrpSpPr>
-        <p:cNvPr id="403" name="Shape 403"/>
+        <p:cNvPr id="399" name="Shape 399"/>
         <p:cNvGrpSpPr/>
         <p:nvPr/>
       </p:nvGrpSpPr>
@@ -3517,7 +3524,7 @@
       </p:grpSpPr>
       <p:sp>
         <p:nvSpPr>
-          <p:cNvPr id="404" name="Google Shape;404;g1e444f14275_0_28:notes"/>
+          <p:cNvPr id="400" name="Google Shape;400;g1e50f0a7202_0_28:notes"/>
           <p:cNvSpPr/>
           <p:nvPr>
             <p:ph idx="2" type="sldImg"/>
@@ -3552,7 +3559,7 @@
       </p:sp>
       <p:sp>
         <p:nvSpPr>
-          <p:cNvPr id="405" name="Google Shape;405;g1e444f14275_0_28:notes"/>
+          <p:cNvPr id="401" name="Google Shape;401;g1e50f0a7202_0_28:notes"/>
           <p:cNvSpPr txBox="1"/>
           <p:nvPr>
             <p:ph idx="1" type="body"/>
@@ -3602,7 +3609,7 @@
   <p:cSld>
     <p:spTree>
       <p:nvGrpSpPr>
-        <p:cNvPr id="414" name="Shape 414"/>
+        <p:cNvPr id="410" name="Shape 410"/>
         <p:cNvGrpSpPr/>
         <p:nvPr/>
       </p:nvGrpSpPr>
@@ -3616,7 +3623,7 @@
       </p:grpSpPr>
       <p:sp>
         <p:nvSpPr>
-          <p:cNvPr id="415" name="Google Shape;415;g1e444f14275_0_17:notes"/>
+          <p:cNvPr id="411" name="Google Shape;411;g1e444f14275_0_0:notes"/>
           <p:cNvSpPr/>
           <p:nvPr>
             <p:ph idx="2" type="sldImg"/>
@@ -3651,7 +3658,7 @@
       </p:sp>
       <p:sp>
         <p:nvSpPr>
-          <p:cNvPr id="416" name="Google Shape;416;g1e444f14275_0_17:notes"/>
+          <p:cNvPr id="412" name="Google Shape;412;g1e444f14275_0_0:notes"/>
           <p:cNvSpPr txBox="1"/>
           <p:nvPr>
             <p:ph idx="1" type="body"/>
@@ -3701,7 +3708,7 @@
   <p:cSld>
     <p:spTree>
       <p:nvGrpSpPr>
-        <p:cNvPr id="423" name="Shape 423"/>
+        <p:cNvPr id="421" name="Shape 421"/>
         <p:cNvGrpSpPr/>
         <p:nvPr/>
       </p:nvGrpSpPr>
@@ -3715,7 +3722,7 @@
       </p:grpSpPr>
       <p:sp>
         <p:nvSpPr>
-          <p:cNvPr id="424" name="Google Shape;424;g1e444f14275_0_39:notes"/>
+          <p:cNvPr id="422" name="Google Shape;422;g1e444f14275_0_8:notes"/>
           <p:cNvSpPr/>
           <p:nvPr>
             <p:ph idx="2" type="sldImg"/>
@@ -3750,7 +3757,7 @@
       </p:sp>
       <p:sp>
         <p:nvSpPr>
-          <p:cNvPr id="425" name="Google Shape;425;g1e444f14275_0_39:notes"/>
+          <p:cNvPr id="423" name="Google Shape;423;g1e444f14275_0_8:notes"/>
           <p:cNvSpPr txBox="1"/>
           <p:nvPr>
             <p:ph idx="1" type="body"/>
@@ -3814,7 +3821,7 @@
       </p:grpSpPr>
       <p:sp>
         <p:nvSpPr>
-          <p:cNvPr id="433" name="Google Shape;433;g1e444f14275_0_47:notes"/>
+          <p:cNvPr id="433" name="Google Shape;433;g1e444f14275_0_28:notes"/>
           <p:cNvSpPr/>
           <p:nvPr>
             <p:ph idx="2" type="sldImg"/>
@@ -3849,7 +3856,7 @@
       </p:sp>
       <p:sp>
         <p:nvSpPr>
-          <p:cNvPr id="434" name="Google Shape;434;g1e444f14275_0_47:notes"/>
+          <p:cNvPr id="434" name="Google Shape;434;g1e444f14275_0_28:notes"/>
           <p:cNvSpPr txBox="1"/>
           <p:nvPr>
             <p:ph idx="1" type="body"/>
@@ -3899,7 +3906,7 @@
   <p:cSld>
     <p:spTree>
       <p:nvGrpSpPr>
-        <p:cNvPr id="441" name="Shape 441"/>
+        <p:cNvPr id="443" name="Shape 443"/>
         <p:cNvGrpSpPr/>
         <p:nvPr/>
       </p:nvGrpSpPr>
@@ -3913,7 +3920,7 @@
       </p:grpSpPr>
       <p:sp>
         <p:nvSpPr>
-          <p:cNvPr id="442" name="Google Shape;442;g255b516ec37_0_7:notes"/>
+          <p:cNvPr id="444" name="Google Shape;444;g1e444f14275_0_17:notes"/>
           <p:cNvSpPr/>
           <p:nvPr>
             <p:ph idx="2" type="sldImg"/>
@@ -3948,7 +3955,7 @@
       </p:sp>
       <p:sp>
         <p:nvSpPr>
-          <p:cNvPr id="443" name="Google Shape;443;g255b516ec37_0_7:notes"/>
+          <p:cNvPr id="445" name="Google Shape;445;g1e444f14275_0_17:notes"/>
           <p:cNvSpPr txBox="1"/>
           <p:nvPr>
             <p:ph idx="1" type="body"/>
@@ -4097,7 +4104,7 @@
   <p:cSld>
     <p:spTree>
       <p:nvGrpSpPr>
-        <p:cNvPr id="450" name="Shape 450"/>
+        <p:cNvPr id="452" name="Shape 452"/>
         <p:cNvGrpSpPr/>
         <p:nvPr/>
       </p:nvGrpSpPr>
@@ -4111,7 +4118,7 @@
       </p:grpSpPr>
       <p:sp>
         <p:nvSpPr>
-          <p:cNvPr id="451" name="Google Shape;451;g255b516ec37_0_17:notes"/>
+          <p:cNvPr id="453" name="Google Shape;453;g1e444f14275_0_39:notes"/>
           <p:cNvSpPr/>
           <p:nvPr>
             <p:ph idx="2" type="sldImg"/>
@@ -4146,7 +4153,7 @@
       </p:sp>
       <p:sp>
         <p:nvSpPr>
-          <p:cNvPr id="452" name="Google Shape;452;g255b516ec37_0_17:notes"/>
+          <p:cNvPr id="454" name="Google Shape;454;g1e444f14275_0_39:notes"/>
           <p:cNvSpPr txBox="1"/>
           <p:nvPr>
             <p:ph idx="1" type="body"/>
@@ -4196,7 +4203,7 @@
   <p:cSld>
     <p:spTree>
       <p:nvGrpSpPr>
-        <p:cNvPr id="459" name="Shape 459"/>
+        <p:cNvPr id="461" name="Shape 461"/>
         <p:cNvGrpSpPr/>
         <p:nvPr/>
       </p:nvGrpSpPr>
@@ -4210,7 +4217,7 @@
       </p:grpSpPr>
       <p:sp>
         <p:nvSpPr>
-          <p:cNvPr id="460" name="Google Shape;460;g255b516ec37_0_0:notes"/>
+          <p:cNvPr id="462" name="Google Shape;462;g1e444f14275_0_47:notes"/>
           <p:cNvSpPr/>
           <p:nvPr>
             <p:ph idx="2" type="sldImg"/>
@@ -4245,7 +4252,700 @@
       </p:sp>
       <p:sp>
         <p:nvSpPr>
-          <p:cNvPr id="461" name="Google Shape;461;g255b516ec37_0_0:notes"/>
+          <p:cNvPr id="463" name="Google Shape;463;g1e444f14275_0_47:notes"/>
+          <p:cNvSpPr txBox="1"/>
+          <p:nvPr>
+            <p:ph idx="1" type="body"/>
+          </p:nvPr>
+        </p:nvSpPr>
+        <p:spPr>
+          <a:xfrm>
+            <a:off x="685800" y="4343400"/>
+            <a:ext cx="5486400" cy="4114800"/>
+          </a:xfrm>
+          <a:prstGeom prst="rect">
+            <a:avLst/>
+          </a:prstGeom>
+        </p:spPr>
+        <p:txBody>
+          <a:bodyPr anchorCtr="0" anchor="t" bIns="91425" lIns="91425" spcFirstLastPara="1" rIns="91425" wrap="square" tIns="91425">
+            <a:noAutofit/>
+          </a:bodyPr>
+          <a:lstStyle/>
+          <a:p>
+            <a:pPr indent="0" lvl="0" marL="0" rtl="0" algn="l">
+              <a:spcBef>
+                <a:spcPts val="0"/>
+              </a:spcBef>
+              <a:spcAft>
+                <a:spcPts val="0"/>
+              </a:spcAft>
+              <a:buNone/>
+            </a:pPr>
+            <a:r>
+              <a:t/>
+            </a:r>
+            <a:endParaRPr/>
+          </a:p>
+        </p:txBody>
+      </p:sp>
+    </p:spTree>
+  </p:cSld>
+  <p:clrMapOvr>
+    <a:masterClrMapping/>
+  </p:clrMapOvr>
+</p:notes>
+</file>
+
+<file path=ppt/notesSlides/notesSlide42.xml><?xml version="1.0" encoding="utf-8"?>
+<p:notes xmlns:a="http://schemas.openxmlformats.org/drawingml/2006/main" xmlns:r="http://schemas.openxmlformats.org/officeDocument/2006/relationships" xmlns:mc="http://schemas.openxmlformats.org/markup-compatibility/2006" xmlns:mv="urn:schemas-microsoft-com:mac:vml" xmlns:p="http://schemas.openxmlformats.org/presentationml/2006/main" xmlns:c="http://schemas.openxmlformats.org/drawingml/2006/chart" xmlns:dgm="http://schemas.openxmlformats.org/drawingml/2006/diagram" xmlns:o="urn:schemas-microsoft-com:office:office" xmlns:v="urn:schemas-microsoft-com:vml" xmlns:pvml="urn:schemas-microsoft-com:office:powerpoint" xmlns:com="http://schemas.openxmlformats.org/drawingml/2006/compatibility" xmlns:p14="http://schemas.microsoft.com/office/powerpoint/2010/main" xmlns:p15="http://schemas.microsoft.com/office/powerpoint/2012/main" xmlns:ahyp="http://schemas.microsoft.com/office/drawing/2018/hyperlinkcolor" showMasterPhAnim="0" showMasterSp="0">
+  <p:cSld>
+    <p:spTree>
+      <p:nvGrpSpPr>
+        <p:cNvPr id="470" name="Shape 470"/>
+        <p:cNvGrpSpPr/>
+        <p:nvPr/>
+      </p:nvGrpSpPr>
+      <p:grpSpPr>
+        <a:xfrm>
+          <a:off x="0" y="0"/>
+          <a:ext cx="0" cy="0"/>
+          <a:chOff x="0" y="0"/>
+          <a:chExt cx="0" cy="0"/>
+        </a:xfrm>
+      </p:grpSpPr>
+      <p:sp>
+        <p:nvSpPr>
+          <p:cNvPr id="471" name="Google Shape;471;g255b516ec37_0_7:notes"/>
+          <p:cNvSpPr/>
+          <p:nvPr>
+            <p:ph idx="2" type="sldImg"/>
+          </p:nvPr>
+        </p:nvSpPr>
+        <p:spPr>
+          <a:xfrm>
+            <a:off x="381300" y="685800"/>
+            <a:ext cx="6096000" cy="3429000"/>
+          </a:xfrm>
+          <a:custGeom>
+            <a:rect b="b" l="l" r="r" t="t"/>
+            <a:pathLst>
+              <a:path extrusionOk="0" h="120000" w="120000">
+                <a:moveTo>
+                  <a:pt x="0" y="0"/>
+                </a:moveTo>
+                <a:lnTo>
+                  <a:pt x="120000" y="0"/>
+                </a:lnTo>
+                <a:lnTo>
+                  <a:pt x="120000" y="120000"/>
+                </a:lnTo>
+                <a:lnTo>
+                  <a:pt x="0" y="120000"/>
+                </a:lnTo>
+                <a:close/>
+              </a:path>
+            </a:pathLst>
+          </a:custGeom>
+        </p:spPr>
+      </p:sp>
+      <p:sp>
+        <p:nvSpPr>
+          <p:cNvPr id="472" name="Google Shape;472;g255b516ec37_0_7:notes"/>
+          <p:cNvSpPr txBox="1"/>
+          <p:nvPr>
+            <p:ph idx="1" type="body"/>
+          </p:nvPr>
+        </p:nvSpPr>
+        <p:spPr>
+          <a:xfrm>
+            <a:off x="685800" y="4343400"/>
+            <a:ext cx="5486400" cy="4114800"/>
+          </a:xfrm>
+          <a:prstGeom prst="rect">
+            <a:avLst/>
+          </a:prstGeom>
+        </p:spPr>
+        <p:txBody>
+          <a:bodyPr anchorCtr="0" anchor="t" bIns="91425" lIns="91425" spcFirstLastPara="1" rIns="91425" wrap="square" tIns="91425">
+            <a:noAutofit/>
+          </a:bodyPr>
+          <a:lstStyle/>
+          <a:p>
+            <a:pPr indent="0" lvl="0" marL="0" rtl="0" algn="l">
+              <a:spcBef>
+                <a:spcPts val="0"/>
+              </a:spcBef>
+              <a:spcAft>
+                <a:spcPts val="0"/>
+              </a:spcAft>
+              <a:buNone/>
+            </a:pPr>
+            <a:r>
+              <a:t/>
+            </a:r>
+            <a:endParaRPr/>
+          </a:p>
+        </p:txBody>
+      </p:sp>
+    </p:spTree>
+  </p:cSld>
+  <p:clrMapOvr>
+    <a:masterClrMapping/>
+  </p:clrMapOvr>
+</p:notes>
+</file>
+
+<file path=ppt/notesSlides/notesSlide43.xml><?xml version="1.0" encoding="utf-8"?>
+<p:notes xmlns:a="http://schemas.openxmlformats.org/drawingml/2006/main" xmlns:r="http://schemas.openxmlformats.org/officeDocument/2006/relationships" xmlns:mc="http://schemas.openxmlformats.org/markup-compatibility/2006" xmlns:mv="urn:schemas-microsoft-com:mac:vml" xmlns:p="http://schemas.openxmlformats.org/presentationml/2006/main" xmlns:c="http://schemas.openxmlformats.org/drawingml/2006/chart" xmlns:dgm="http://schemas.openxmlformats.org/drawingml/2006/diagram" xmlns:o="urn:schemas-microsoft-com:office:office" xmlns:v="urn:schemas-microsoft-com:vml" xmlns:pvml="urn:schemas-microsoft-com:office:powerpoint" xmlns:com="http://schemas.openxmlformats.org/drawingml/2006/compatibility" xmlns:p14="http://schemas.microsoft.com/office/powerpoint/2010/main" xmlns:p15="http://schemas.microsoft.com/office/powerpoint/2012/main" xmlns:ahyp="http://schemas.microsoft.com/office/drawing/2018/hyperlinkcolor" showMasterPhAnim="0" showMasterSp="0">
+  <p:cSld>
+    <p:spTree>
+      <p:nvGrpSpPr>
+        <p:cNvPr id="479" name="Shape 479"/>
+        <p:cNvGrpSpPr/>
+        <p:nvPr/>
+      </p:nvGrpSpPr>
+      <p:grpSpPr>
+        <a:xfrm>
+          <a:off x="0" y="0"/>
+          <a:ext cx="0" cy="0"/>
+          <a:chOff x="0" y="0"/>
+          <a:chExt cx="0" cy="0"/>
+        </a:xfrm>
+      </p:grpSpPr>
+      <p:sp>
+        <p:nvSpPr>
+          <p:cNvPr id="480" name="Google Shape;480;g255b516ec37_0_17:notes"/>
+          <p:cNvSpPr/>
+          <p:nvPr>
+            <p:ph idx="2" type="sldImg"/>
+          </p:nvPr>
+        </p:nvSpPr>
+        <p:spPr>
+          <a:xfrm>
+            <a:off x="381300" y="685800"/>
+            <a:ext cx="6096000" cy="3429000"/>
+          </a:xfrm>
+          <a:custGeom>
+            <a:rect b="b" l="l" r="r" t="t"/>
+            <a:pathLst>
+              <a:path extrusionOk="0" h="120000" w="120000">
+                <a:moveTo>
+                  <a:pt x="0" y="0"/>
+                </a:moveTo>
+                <a:lnTo>
+                  <a:pt x="120000" y="0"/>
+                </a:lnTo>
+                <a:lnTo>
+                  <a:pt x="120000" y="120000"/>
+                </a:lnTo>
+                <a:lnTo>
+                  <a:pt x="0" y="120000"/>
+                </a:lnTo>
+                <a:close/>
+              </a:path>
+            </a:pathLst>
+          </a:custGeom>
+        </p:spPr>
+      </p:sp>
+      <p:sp>
+        <p:nvSpPr>
+          <p:cNvPr id="481" name="Google Shape;481;g255b516ec37_0_17:notes"/>
+          <p:cNvSpPr txBox="1"/>
+          <p:nvPr>
+            <p:ph idx="1" type="body"/>
+          </p:nvPr>
+        </p:nvSpPr>
+        <p:spPr>
+          <a:xfrm>
+            <a:off x="685800" y="4343400"/>
+            <a:ext cx="5486400" cy="4114800"/>
+          </a:xfrm>
+          <a:prstGeom prst="rect">
+            <a:avLst/>
+          </a:prstGeom>
+        </p:spPr>
+        <p:txBody>
+          <a:bodyPr anchorCtr="0" anchor="t" bIns="91425" lIns="91425" spcFirstLastPara="1" rIns="91425" wrap="square" tIns="91425">
+            <a:noAutofit/>
+          </a:bodyPr>
+          <a:lstStyle/>
+          <a:p>
+            <a:pPr indent="0" lvl="0" marL="0" rtl="0" algn="l">
+              <a:spcBef>
+                <a:spcPts val="0"/>
+              </a:spcBef>
+              <a:spcAft>
+                <a:spcPts val="0"/>
+              </a:spcAft>
+              <a:buNone/>
+            </a:pPr>
+            <a:r>
+              <a:t/>
+            </a:r>
+            <a:endParaRPr/>
+          </a:p>
+        </p:txBody>
+      </p:sp>
+    </p:spTree>
+  </p:cSld>
+  <p:clrMapOvr>
+    <a:masterClrMapping/>
+  </p:clrMapOvr>
+</p:notes>
+</file>
+
+<file path=ppt/notesSlides/notesSlide44.xml><?xml version="1.0" encoding="utf-8"?>
+<p:notes xmlns:a="http://schemas.openxmlformats.org/drawingml/2006/main" xmlns:r="http://schemas.openxmlformats.org/officeDocument/2006/relationships" xmlns:mc="http://schemas.openxmlformats.org/markup-compatibility/2006" xmlns:mv="urn:schemas-microsoft-com:mac:vml" xmlns:p="http://schemas.openxmlformats.org/presentationml/2006/main" xmlns:c="http://schemas.openxmlformats.org/drawingml/2006/chart" xmlns:dgm="http://schemas.openxmlformats.org/drawingml/2006/diagram" xmlns:o="urn:schemas-microsoft-com:office:office" xmlns:v="urn:schemas-microsoft-com:vml" xmlns:pvml="urn:schemas-microsoft-com:office:powerpoint" xmlns:com="http://schemas.openxmlformats.org/drawingml/2006/compatibility" xmlns:p14="http://schemas.microsoft.com/office/powerpoint/2010/main" xmlns:p15="http://schemas.microsoft.com/office/powerpoint/2012/main" xmlns:ahyp="http://schemas.microsoft.com/office/drawing/2018/hyperlinkcolor" showMasterPhAnim="0" showMasterSp="0">
+  <p:cSld>
+    <p:spTree>
+      <p:nvGrpSpPr>
+        <p:cNvPr id="488" name="Shape 488"/>
+        <p:cNvGrpSpPr/>
+        <p:nvPr/>
+      </p:nvGrpSpPr>
+      <p:grpSpPr>
+        <a:xfrm>
+          <a:off x="0" y="0"/>
+          <a:ext cx="0" cy="0"/>
+          <a:chOff x="0" y="0"/>
+          <a:chExt cx="0" cy="0"/>
+        </a:xfrm>
+      </p:grpSpPr>
+      <p:sp>
+        <p:nvSpPr>
+          <p:cNvPr id="489" name="Google Shape;489;g255b516ec37_0_0:notes"/>
+          <p:cNvSpPr/>
+          <p:nvPr>
+            <p:ph idx="2" type="sldImg"/>
+          </p:nvPr>
+        </p:nvSpPr>
+        <p:spPr>
+          <a:xfrm>
+            <a:off x="381300" y="685800"/>
+            <a:ext cx="6096000" cy="3429000"/>
+          </a:xfrm>
+          <a:custGeom>
+            <a:rect b="b" l="l" r="r" t="t"/>
+            <a:pathLst>
+              <a:path extrusionOk="0" h="120000" w="120000">
+                <a:moveTo>
+                  <a:pt x="0" y="0"/>
+                </a:moveTo>
+                <a:lnTo>
+                  <a:pt x="120000" y="0"/>
+                </a:lnTo>
+                <a:lnTo>
+                  <a:pt x="120000" y="120000"/>
+                </a:lnTo>
+                <a:lnTo>
+                  <a:pt x="0" y="120000"/>
+                </a:lnTo>
+                <a:close/>
+              </a:path>
+            </a:pathLst>
+          </a:custGeom>
+        </p:spPr>
+      </p:sp>
+      <p:sp>
+        <p:nvSpPr>
+          <p:cNvPr id="490" name="Google Shape;490;g255b516ec37_0_0:notes"/>
+          <p:cNvSpPr txBox="1"/>
+          <p:nvPr>
+            <p:ph idx="1" type="body"/>
+          </p:nvPr>
+        </p:nvSpPr>
+        <p:spPr>
+          <a:xfrm>
+            <a:off x="685800" y="4343400"/>
+            <a:ext cx="5486400" cy="4114800"/>
+          </a:xfrm>
+          <a:prstGeom prst="rect">
+            <a:avLst/>
+          </a:prstGeom>
+        </p:spPr>
+        <p:txBody>
+          <a:bodyPr anchorCtr="0" anchor="t" bIns="91425" lIns="91425" spcFirstLastPara="1" rIns="91425" wrap="square" tIns="91425">
+            <a:noAutofit/>
+          </a:bodyPr>
+          <a:lstStyle/>
+          <a:p>
+            <a:pPr indent="0" lvl="0" marL="0" rtl="0" algn="l">
+              <a:spcBef>
+                <a:spcPts val="0"/>
+              </a:spcBef>
+              <a:spcAft>
+                <a:spcPts val="0"/>
+              </a:spcAft>
+              <a:buNone/>
+            </a:pPr>
+            <a:r>
+              <a:t/>
+            </a:r>
+            <a:endParaRPr/>
+          </a:p>
+        </p:txBody>
+      </p:sp>
+    </p:spTree>
+  </p:cSld>
+  <p:clrMapOvr>
+    <a:masterClrMapping/>
+  </p:clrMapOvr>
+</p:notes>
+</file>
+
+<file path=ppt/notesSlides/notesSlide45.xml><?xml version="1.0" encoding="utf-8"?>
+<p:notes xmlns:a="http://schemas.openxmlformats.org/drawingml/2006/main" xmlns:r="http://schemas.openxmlformats.org/officeDocument/2006/relationships" xmlns:mc="http://schemas.openxmlformats.org/markup-compatibility/2006" xmlns:mv="urn:schemas-microsoft-com:mac:vml" xmlns:p="http://schemas.openxmlformats.org/presentationml/2006/main" xmlns:c="http://schemas.openxmlformats.org/drawingml/2006/chart" xmlns:dgm="http://schemas.openxmlformats.org/drawingml/2006/diagram" xmlns:o="urn:schemas-microsoft-com:office:office" xmlns:v="urn:schemas-microsoft-com:vml" xmlns:pvml="urn:schemas-microsoft-com:office:powerpoint" xmlns:com="http://schemas.openxmlformats.org/drawingml/2006/compatibility" xmlns:p14="http://schemas.microsoft.com/office/powerpoint/2010/main" xmlns:p15="http://schemas.microsoft.com/office/powerpoint/2012/main" xmlns:ahyp="http://schemas.microsoft.com/office/drawing/2018/hyperlinkcolor" showMasterPhAnim="0" showMasterSp="0">
+  <p:cSld>
+    <p:spTree>
+      <p:nvGrpSpPr>
+        <p:cNvPr id="497" name="Shape 497"/>
+        <p:cNvGrpSpPr/>
+        <p:nvPr/>
+      </p:nvGrpSpPr>
+      <p:grpSpPr>
+        <a:xfrm>
+          <a:off x="0" y="0"/>
+          <a:ext cx="0" cy="0"/>
+          <a:chOff x="0" y="0"/>
+          <a:chExt cx="0" cy="0"/>
+        </a:xfrm>
+      </p:grpSpPr>
+      <p:sp>
+        <p:nvSpPr>
+          <p:cNvPr id="498" name="Google Shape;498;g1e4fa57f1f4_0_0:notes"/>
+          <p:cNvSpPr/>
+          <p:nvPr>
+            <p:ph idx="2" type="sldImg"/>
+          </p:nvPr>
+        </p:nvSpPr>
+        <p:spPr>
+          <a:xfrm>
+            <a:off x="381300" y="685800"/>
+            <a:ext cx="6096000" cy="3429000"/>
+          </a:xfrm>
+          <a:custGeom>
+            <a:rect b="b" l="l" r="r" t="t"/>
+            <a:pathLst>
+              <a:path extrusionOk="0" h="120000" w="120000">
+                <a:moveTo>
+                  <a:pt x="0" y="0"/>
+                </a:moveTo>
+                <a:lnTo>
+                  <a:pt x="120000" y="0"/>
+                </a:lnTo>
+                <a:lnTo>
+                  <a:pt x="120000" y="120000"/>
+                </a:lnTo>
+                <a:lnTo>
+                  <a:pt x="0" y="120000"/>
+                </a:lnTo>
+                <a:close/>
+              </a:path>
+            </a:pathLst>
+          </a:custGeom>
+        </p:spPr>
+      </p:sp>
+      <p:sp>
+        <p:nvSpPr>
+          <p:cNvPr id="499" name="Google Shape;499;g1e4fa57f1f4_0_0:notes"/>
+          <p:cNvSpPr txBox="1"/>
+          <p:nvPr>
+            <p:ph idx="1" type="body"/>
+          </p:nvPr>
+        </p:nvSpPr>
+        <p:spPr>
+          <a:xfrm>
+            <a:off x="685800" y="4343400"/>
+            <a:ext cx="5486400" cy="4114800"/>
+          </a:xfrm>
+          <a:prstGeom prst="rect">
+            <a:avLst/>
+          </a:prstGeom>
+        </p:spPr>
+        <p:txBody>
+          <a:bodyPr anchorCtr="0" anchor="t" bIns="91425" lIns="91425" spcFirstLastPara="1" rIns="91425" wrap="square" tIns="91425">
+            <a:noAutofit/>
+          </a:bodyPr>
+          <a:lstStyle/>
+          <a:p>
+            <a:pPr indent="0" lvl="0" marL="0" rtl="0" algn="l">
+              <a:spcBef>
+                <a:spcPts val="0"/>
+              </a:spcBef>
+              <a:spcAft>
+                <a:spcPts val="0"/>
+              </a:spcAft>
+              <a:buNone/>
+            </a:pPr>
+            <a:r>
+              <a:t/>
+            </a:r>
+            <a:endParaRPr/>
+          </a:p>
+        </p:txBody>
+      </p:sp>
+    </p:spTree>
+  </p:cSld>
+  <p:clrMapOvr>
+    <a:masterClrMapping/>
+  </p:clrMapOvr>
+</p:notes>
+</file>
+
+<file path=ppt/notesSlides/notesSlide46.xml><?xml version="1.0" encoding="utf-8"?>
+<p:notes xmlns:a="http://schemas.openxmlformats.org/drawingml/2006/main" xmlns:r="http://schemas.openxmlformats.org/officeDocument/2006/relationships" xmlns:mc="http://schemas.openxmlformats.org/markup-compatibility/2006" xmlns:mv="urn:schemas-microsoft-com:mac:vml" xmlns:p="http://schemas.openxmlformats.org/presentationml/2006/main" xmlns:c="http://schemas.openxmlformats.org/drawingml/2006/chart" xmlns:dgm="http://schemas.openxmlformats.org/drawingml/2006/diagram" xmlns:o="urn:schemas-microsoft-com:office:office" xmlns:v="urn:schemas-microsoft-com:vml" xmlns:pvml="urn:schemas-microsoft-com:office:powerpoint" xmlns:com="http://schemas.openxmlformats.org/drawingml/2006/compatibility" xmlns:p14="http://schemas.microsoft.com/office/powerpoint/2010/main" xmlns:p15="http://schemas.microsoft.com/office/powerpoint/2012/main" xmlns:ahyp="http://schemas.microsoft.com/office/drawing/2018/hyperlinkcolor" showMasterPhAnim="0" showMasterSp="0">
+  <p:cSld>
+    <p:spTree>
+      <p:nvGrpSpPr>
+        <p:cNvPr id="508" name="Shape 508"/>
+        <p:cNvGrpSpPr/>
+        <p:nvPr/>
+      </p:nvGrpSpPr>
+      <p:grpSpPr>
+        <a:xfrm>
+          <a:off x="0" y="0"/>
+          <a:ext cx="0" cy="0"/>
+          <a:chOff x="0" y="0"/>
+          <a:chExt cx="0" cy="0"/>
+        </a:xfrm>
+      </p:grpSpPr>
+      <p:sp>
+        <p:nvSpPr>
+          <p:cNvPr id="509" name="Google Shape;509;g1e4fa57f1f4_0_24:notes"/>
+          <p:cNvSpPr/>
+          <p:nvPr>
+            <p:ph idx="2" type="sldImg"/>
+          </p:nvPr>
+        </p:nvSpPr>
+        <p:spPr>
+          <a:xfrm>
+            <a:off x="381300" y="685800"/>
+            <a:ext cx="6096000" cy="3429000"/>
+          </a:xfrm>
+          <a:custGeom>
+            <a:rect b="b" l="l" r="r" t="t"/>
+            <a:pathLst>
+              <a:path extrusionOk="0" h="120000" w="120000">
+                <a:moveTo>
+                  <a:pt x="0" y="0"/>
+                </a:moveTo>
+                <a:lnTo>
+                  <a:pt x="120000" y="0"/>
+                </a:lnTo>
+                <a:lnTo>
+                  <a:pt x="120000" y="120000"/>
+                </a:lnTo>
+                <a:lnTo>
+                  <a:pt x="0" y="120000"/>
+                </a:lnTo>
+                <a:close/>
+              </a:path>
+            </a:pathLst>
+          </a:custGeom>
+        </p:spPr>
+      </p:sp>
+      <p:sp>
+        <p:nvSpPr>
+          <p:cNvPr id="510" name="Google Shape;510;g1e4fa57f1f4_0_24:notes"/>
+          <p:cNvSpPr txBox="1"/>
+          <p:nvPr>
+            <p:ph idx="1" type="body"/>
+          </p:nvPr>
+        </p:nvSpPr>
+        <p:spPr>
+          <a:xfrm>
+            <a:off x="685800" y="4343400"/>
+            <a:ext cx="5486400" cy="4114800"/>
+          </a:xfrm>
+          <a:prstGeom prst="rect">
+            <a:avLst/>
+          </a:prstGeom>
+        </p:spPr>
+        <p:txBody>
+          <a:bodyPr anchorCtr="0" anchor="t" bIns="91425" lIns="91425" spcFirstLastPara="1" rIns="91425" wrap="square" tIns="91425">
+            <a:noAutofit/>
+          </a:bodyPr>
+          <a:lstStyle/>
+          <a:p>
+            <a:pPr indent="0" lvl="0" marL="0" rtl="0" algn="l">
+              <a:spcBef>
+                <a:spcPts val="0"/>
+              </a:spcBef>
+              <a:spcAft>
+                <a:spcPts val="0"/>
+              </a:spcAft>
+              <a:buNone/>
+            </a:pPr>
+            <a:r>
+              <a:t/>
+            </a:r>
+            <a:endParaRPr/>
+          </a:p>
+        </p:txBody>
+      </p:sp>
+    </p:spTree>
+  </p:cSld>
+  <p:clrMapOvr>
+    <a:masterClrMapping/>
+  </p:clrMapOvr>
+</p:notes>
+</file>
+
+<file path=ppt/notesSlides/notesSlide47.xml><?xml version="1.0" encoding="utf-8"?>
+<p:notes xmlns:a="http://schemas.openxmlformats.org/drawingml/2006/main" xmlns:r="http://schemas.openxmlformats.org/officeDocument/2006/relationships" xmlns:mc="http://schemas.openxmlformats.org/markup-compatibility/2006" xmlns:mv="urn:schemas-microsoft-com:mac:vml" xmlns:p="http://schemas.openxmlformats.org/presentationml/2006/main" xmlns:c="http://schemas.openxmlformats.org/drawingml/2006/chart" xmlns:dgm="http://schemas.openxmlformats.org/drawingml/2006/diagram" xmlns:o="urn:schemas-microsoft-com:office:office" xmlns:v="urn:schemas-microsoft-com:vml" xmlns:pvml="urn:schemas-microsoft-com:office:powerpoint" xmlns:com="http://schemas.openxmlformats.org/drawingml/2006/compatibility" xmlns:p14="http://schemas.microsoft.com/office/powerpoint/2010/main" xmlns:p15="http://schemas.microsoft.com/office/powerpoint/2012/main" xmlns:ahyp="http://schemas.microsoft.com/office/drawing/2018/hyperlinkcolor" showMasterPhAnim="0" showMasterSp="0">
+  <p:cSld>
+    <p:spTree>
+      <p:nvGrpSpPr>
+        <p:cNvPr id="519" name="Shape 519"/>
+        <p:cNvGrpSpPr/>
+        <p:nvPr/>
+      </p:nvGrpSpPr>
+      <p:grpSpPr>
+        <a:xfrm>
+          <a:off x="0" y="0"/>
+          <a:ext cx="0" cy="0"/>
+          <a:chOff x="0" y="0"/>
+          <a:chExt cx="0" cy="0"/>
+        </a:xfrm>
+      </p:grpSpPr>
+      <p:sp>
+        <p:nvSpPr>
+          <p:cNvPr id="520" name="Google Shape;520;g1e4fa57f1f4_0_59:notes"/>
+          <p:cNvSpPr/>
+          <p:nvPr>
+            <p:ph idx="2" type="sldImg"/>
+          </p:nvPr>
+        </p:nvSpPr>
+        <p:spPr>
+          <a:xfrm>
+            <a:off x="381300" y="685800"/>
+            <a:ext cx="6096000" cy="3429000"/>
+          </a:xfrm>
+          <a:custGeom>
+            <a:rect b="b" l="l" r="r" t="t"/>
+            <a:pathLst>
+              <a:path extrusionOk="0" h="120000" w="120000">
+                <a:moveTo>
+                  <a:pt x="0" y="0"/>
+                </a:moveTo>
+                <a:lnTo>
+                  <a:pt x="120000" y="0"/>
+                </a:lnTo>
+                <a:lnTo>
+                  <a:pt x="120000" y="120000"/>
+                </a:lnTo>
+                <a:lnTo>
+                  <a:pt x="0" y="120000"/>
+                </a:lnTo>
+                <a:close/>
+              </a:path>
+            </a:pathLst>
+          </a:custGeom>
+        </p:spPr>
+      </p:sp>
+      <p:sp>
+        <p:nvSpPr>
+          <p:cNvPr id="521" name="Google Shape;521;g1e4fa57f1f4_0_59:notes"/>
+          <p:cNvSpPr txBox="1"/>
+          <p:nvPr>
+            <p:ph idx="1" type="body"/>
+          </p:nvPr>
+        </p:nvSpPr>
+        <p:spPr>
+          <a:xfrm>
+            <a:off x="685800" y="4343400"/>
+            <a:ext cx="5486400" cy="4114800"/>
+          </a:xfrm>
+          <a:prstGeom prst="rect">
+            <a:avLst/>
+          </a:prstGeom>
+        </p:spPr>
+        <p:txBody>
+          <a:bodyPr anchorCtr="0" anchor="t" bIns="91425" lIns="91425" spcFirstLastPara="1" rIns="91425" wrap="square" tIns="91425">
+            <a:noAutofit/>
+          </a:bodyPr>
+          <a:lstStyle/>
+          <a:p>
+            <a:pPr indent="0" lvl="0" marL="0" rtl="0" algn="l">
+              <a:spcBef>
+                <a:spcPts val="0"/>
+              </a:spcBef>
+              <a:spcAft>
+                <a:spcPts val="0"/>
+              </a:spcAft>
+              <a:buNone/>
+            </a:pPr>
+            <a:r>
+              <a:t/>
+            </a:r>
+            <a:endParaRPr/>
+          </a:p>
+        </p:txBody>
+      </p:sp>
+    </p:spTree>
+  </p:cSld>
+  <p:clrMapOvr>
+    <a:masterClrMapping/>
+  </p:clrMapOvr>
+</p:notes>
+</file>
+
+<file path=ppt/notesSlides/notesSlide48.xml><?xml version="1.0" encoding="utf-8"?>
+<p:notes xmlns:a="http://schemas.openxmlformats.org/drawingml/2006/main" xmlns:r="http://schemas.openxmlformats.org/officeDocument/2006/relationships" xmlns:mc="http://schemas.openxmlformats.org/markup-compatibility/2006" xmlns:mv="urn:schemas-microsoft-com:mac:vml" xmlns:p="http://schemas.openxmlformats.org/presentationml/2006/main" xmlns:c="http://schemas.openxmlformats.org/drawingml/2006/chart" xmlns:dgm="http://schemas.openxmlformats.org/drawingml/2006/diagram" xmlns:o="urn:schemas-microsoft-com:office:office" xmlns:v="urn:schemas-microsoft-com:vml" xmlns:pvml="urn:schemas-microsoft-com:office:powerpoint" xmlns:com="http://schemas.openxmlformats.org/drawingml/2006/compatibility" xmlns:p14="http://schemas.microsoft.com/office/powerpoint/2010/main" xmlns:p15="http://schemas.microsoft.com/office/powerpoint/2012/main" xmlns:ahyp="http://schemas.microsoft.com/office/drawing/2018/hyperlinkcolor" showMasterPhAnim="0" showMasterSp="0">
+  <p:cSld>
+    <p:spTree>
+      <p:nvGrpSpPr>
+        <p:cNvPr id="528" name="Shape 528"/>
+        <p:cNvGrpSpPr/>
+        <p:nvPr/>
+      </p:nvGrpSpPr>
+      <p:grpSpPr>
+        <a:xfrm>
+          <a:off x="0" y="0"/>
+          <a:ext cx="0" cy="0"/>
+          <a:chOff x="0" y="0"/>
+          <a:chExt cx="0" cy="0"/>
+        </a:xfrm>
+      </p:grpSpPr>
+      <p:sp>
+        <p:nvSpPr>
+          <p:cNvPr id="529" name="Google Shape;529;g1e4fa57f1f4_0_36:notes"/>
+          <p:cNvSpPr/>
+          <p:nvPr>
+            <p:ph idx="2" type="sldImg"/>
+          </p:nvPr>
+        </p:nvSpPr>
+        <p:spPr>
+          <a:xfrm>
+            <a:off x="381300" y="685800"/>
+            <a:ext cx="6096000" cy="3429000"/>
+          </a:xfrm>
+          <a:custGeom>
+            <a:rect b="b" l="l" r="r" t="t"/>
+            <a:pathLst>
+              <a:path extrusionOk="0" h="120000" w="120000">
+                <a:moveTo>
+                  <a:pt x="0" y="0"/>
+                </a:moveTo>
+                <a:lnTo>
+                  <a:pt x="120000" y="0"/>
+                </a:lnTo>
+                <a:lnTo>
+                  <a:pt x="120000" y="120000"/>
+                </a:lnTo>
+                <a:lnTo>
+                  <a:pt x="0" y="120000"/>
+                </a:lnTo>
+                <a:close/>
+              </a:path>
+            </a:pathLst>
+          </a:custGeom>
+        </p:spPr>
+      </p:sp>
+      <p:sp>
+        <p:nvSpPr>
+          <p:cNvPr id="530" name="Google Shape;530;g1e4fa57f1f4_0_36:notes"/>
           <p:cNvSpPr txBox="1"/>
           <p:nvPr>
             <p:ph idx="1" type="body"/>
@@ -15337,8 +16037,8 @@
         </p:nvSpPr>
         <p:spPr>
           <a:xfrm>
-            <a:off x="1830750" y="1126950"/>
-            <a:ext cx="5482500" cy="3935700"/>
+            <a:off x="1857325" y="1132000"/>
+            <a:ext cx="5429400" cy="3838200"/>
           </a:xfrm>
           <a:prstGeom prst="rect">
             <a:avLst/>
@@ -15485,8 +16185,8 @@
         </p:blipFill>
         <p:spPr>
           <a:xfrm>
-            <a:off x="1865850" y="1146450"/>
-            <a:ext cx="5447350" cy="3916201"/>
+            <a:off x="1892085" y="1151017"/>
+            <a:ext cx="5394567" cy="3819108"/>
           </a:xfrm>
           <a:prstGeom prst="rect">
             <a:avLst/>
@@ -16842,8 +17542,8 @@
         </p:nvSpPr>
         <p:spPr>
           <a:xfrm>
-            <a:off x="145350" y="1412925"/>
-            <a:ext cx="8853300" cy="2989200"/>
+            <a:off x="415663" y="1591513"/>
+            <a:ext cx="8312700" cy="2805000"/>
           </a:xfrm>
           <a:prstGeom prst="rect">
             <a:avLst/>
@@ -16893,8 +17593,8 @@
         </p:nvSpPr>
         <p:spPr>
           <a:xfrm>
-            <a:off x="2226450" y="698200"/>
-            <a:ext cx="4691100" cy="441000"/>
+            <a:off x="1768350" y="617900"/>
+            <a:ext cx="5607300" cy="441000"/>
           </a:xfrm>
           <a:prstGeom prst="rect">
             <a:avLst/>
@@ -16918,7 +17618,15 @@
             </a:pPr>
             <a:r>
               <a:rPr b="1" lang="pt-BR" sz="2200"/>
-              <a:t>Realizando o merge</a:t>
+              <a:t>Revis</a:t>
+            </a:r>
+            <a:r>
+              <a:rPr b="1" lang="pt-BR" sz="2200"/>
+              <a:t>ando um</a:t>
+            </a:r>
+            <a:r>
+              <a:rPr b="1" lang="pt-BR" sz="2200"/>
+              <a:t> pull request</a:t>
             </a:r>
             <a:endParaRPr b="1" sz="2200"/>
           </a:p>
@@ -16990,8 +17698,8 @@
         </p:blipFill>
         <p:spPr>
           <a:xfrm>
-            <a:off x="213642" y="1479193"/>
-            <a:ext cx="8723277" cy="2840993"/>
+            <a:off x="448563" y="1624075"/>
+            <a:ext cx="8246874" cy="2739875"/>
           </a:xfrm>
           <a:prstGeom prst="rect">
             <a:avLst/>
@@ -17084,8 +17792,8 @@
         </p:nvSpPr>
         <p:spPr>
           <a:xfrm>
-            <a:off x="4695125" y="1799378"/>
-            <a:ext cx="4286700" cy="2296800"/>
+            <a:off x="674250" y="1108625"/>
+            <a:ext cx="7795500" cy="3846600"/>
           </a:xfrm>
           <a:prstGeom prst="rect">
             <a:avLst/>
@@ -17128,55 +17836,6 @@
       <p:sp>
         <p:nvSpPr>
           <p:cNvPr id="387" name="Google Shape;387;p45"/>
-          <p:cNvSpPr/>
-          <p:nvPr/>
-        </p:nvSpPr>
-        <p:spPr>
-          <a:xfrm>
-            <a:off x="181500" y="1277863"/>
-            <a:ext cx="4390500" cy="3339600"/>
-          </a:xfrm>
-          <a:prstGeom prst="rect">
-            <a:avLst/>
-          </a:prstGeom>
-          <a:solidFill>
-            <a:schemeClr val="lt1"/>
-          </a:solidFill>
-          <a:ln cap="flat" cmpd="sng" w="9525">
-            <a:solidFill>
-              <a:schemeClr val="dk2"/>
-            </a:solidFill>
-            <a:prstDash val="solid"/>
-            <a:round/>
-            <a:headEnd len="sm" w="sm" type="none"/>
-            <a:tailEnd len="sm" w="sm" type="none"/>
-          </a:ln>
-        </p:spPr>
-        <p:txBody>
-          <a:bodyPr anchorCtr="0" anchor="ctr" bIns="91425" lIns="91425" spcFirstLastPara="1" rIns="91425" wrap="square" tIns="91425">
-            <a:noAutofit/>
-          </a:bodyPr>
-          <a:lstStyle/>
-          <a:p>
-            <a:pPr indent="0" lvl="0" marL="0" rtl="0" algn="l">
-              <a:spcBef>
-                <a:spcPts val="0"/>
-              </a:spcBef>
-              <a:spcAft>
-                <a:spcPts val="0"/>
-              </a:spcAft>
-              <a:buNone/>
-            </a:pPr>
-            <a:r>
-              <a:t/>
-            </a:r>
-            <a:endParaRPr/>
-          </a:p>
-        </p:txBody>
-      </p:sp>
-      <p:sp>
-        <p:nvSpPr>
-          <p:cNvPr id="388" name="Google Shape;388;p45"/>
           <p:cNvSpPr txBox="1"/>
           <p:nvPr>
             <p:ph type="ctrTitle"/>
@@ -17184,8 +17843,8 @@
         </p:nvSpPr>
         <p:spPr>
           <a:xfrm>
-            <a:off x="2226450" y="613550"/>
-            <a:ext cx="4691100" cy="441000"/>
+            <a:off x="1768350" y="617900"/>
+            <a:ext cx="5607300" cy="441000"/>
           </a:xfrm>
           <a:prstGeom prst="rect">
             <a:avLst/>
@@ -17209,7 +17868,7 @@
             </a:pPr>
             <a:r>
               <a:rPr b="1" lang="pt-BR" sz="2200"/>
-              <a:t>O que é Tag e como funciona?</a:t>
+              <a:t>Revisando um pull request</a:t>
             </a:r>
             <a:endParaRPr b="1" sz="2200"/>
           </a:p>
@@ -17217,7 +17876,7 @@
       </p:sp>
       <p:sp>
         <p:nvSpPr>
-          <p:cNvPr id="389" name="Google Shape;389;p45"/>
+          <p:cNvPr id="388" name="Google Shape;388;p45"/>
           <p:cNvSpPr txBox="1"/>
           <p:nvPr/>
         </p:nvSpPr>
@@ -17255,7 +17914,7 @@
                   <a:schemeClr val="dk1"/>
                 </a:solidFill>
               </a:rPr>
-              <a:t>Módulo 7: Tag e Releases</a:t>
+              <a:t>Módulo 6: Pull request</a:t>
             </a:r>
             <a:endParaRPr b="1" sz="1200">
               <a:solidFill>
@@ -17267,7 +17926,7 @@
       </p:sp>
       <p:pic>
         <p:nvPicPr>
-          <p:cNvPr id="390" name="Google Shape;390;p45"/>
+          <p:cNvPr id="389" name="Google Shape;389;p45"/>
           <p:cNvPicPr preferRelativeResize="0"/>
           <p:nvPr/>
         </p:nvPicPr>
@@ -17281,36 +17940,8 @@
         </p:blipFill>
         <p:spPr>
           <a:xfrm>
-            <a:off x="204763" y="1277850"/>
-            <a:ext cx="4343975" cy="3339723"/>
-          </a:xfrm>
-          <a:prstGeom prst="rect">
-            <a:avLst/>
-          </a:prstGeom>
-          <a:noFill/>
-          <a:ln>
-            <a:noFill/>
-          </a:ln>
-        </p:spPr>
-      </p:pic>
-      <p:pic>
-        <p:nvPicPr>
-          <p:cNvPr id="391" name="Google Shape;391;p45"/>
-          <p:cNvPicPr preferRelativeResize="0"/>
-          <p:nvPr/>
-        </p:nvPicPr>
-        <p:blipFill>
-          <a:blip r:embed="rId4">
-            <a:alphaModFix/>
-          </a:blip>
-          <a:stretch>
-            <a:fillRect/>
-          </a:stretch>
-        </p:blipFill>
-        <p:spPr>
-          <a:xfrm>
-            <a:off x="4695125" y="1799275"/>
-            <a:ext cx="4286522" cy="2296874"/>
+            <a:off x="714075" y="1144413"/>
+            <a:ext cx="7715849" cy="3775025"/>
           </a:xfrm>
           <a:prstGeom prst="rect">
             <a:avLst/>
@@ -17334,7 +17965,7 @@
   <p:cSld>
     <p:spTree>
       <p:nvGrpSpPr>
-        <p:cNvPr id="395" name="Shape 395"/>
+        <p:cNvPr id="393" name="Shape 393"/>
         <p:cNvGrpSpPr/>
         <p:nvPr/>
       </p:nvGrpSpPr>
@@ -17348,7 +17979,7 @@
       </p:grpSpPr>
       <p:sp>
         <p:nvSpPr>
-          <p:cNvPr id="396" name="Google Shape;396;p46"/>
+          <p:cNvPr id="394" name="Google Shape;394;p46"/>
           <p:cNvSpPr/>
           <p:nvPr/>
         </p:nvSpPr>
@@ -17397,14 +18028,14 @@
       </p:sp>
       <p:sp>
         <p:nvSpPr>
-          <p:cNvPr id="397" name="Google Shape;397;p46"/>
+          <p:cNvPr id="395" name="Google Shape;395;p46"/>
           <p:cNvSpPr/>
           <p:nvPr/>
         </p:nvSpPr>
         <p:spPr>
           <a:xfrm>
-            <a:off x="1322250" y="2412900"/>
-            <a:ext cx="6527700" cy="2632200"/>
+            <a:off x="1661413" y="1160738"/>
+            <a:ext cx="5821200" cy="3810300"/>
           </a:xfrm>
           <a:prstGeom prst="rect">
             <a:avLst/>
@@ -17446,56 +18077,7 @@
       </p:sp>
       <p:sp>
         <p:nvSpPr>
-          <p:cNvPr id="398" name="Google Shape;398;p46"/>
-          <p:cNvSpPr/>
-          <p:nvPr/>
-        </p:nvSpPr>
-        <p:spPr>
-          <a:xfrm>
-            <a:off x="3146850" y="1169586"/>
-            <a:ext cx="2850300" cy="1136400"/>
-          </a:xfrm>
-          <a:prstGeom prst="rect">
-            <a:avLst/>
-          </a:prstGeom>
-          <a:solidFill>
-            <a:schemeClr val="lt1"/>
-          </a:solidFill>
-          <a:ln cap="flat" cmpd="sng" w="9525">
-            <a:solidFill>
-              <a:schemeClr val="dk2"/>
-            </a:solidFill>
-            <a:prstDash val="solid"/>
-            <a:round/>
-            <a:headEnd len="sm" w="sm" type="none"/>
-            <a:tailEnd len="sm" w="sm" type="none"/>
-          </a:ln>
-        </p:spPr>
-        <p:txBody>
-          <a:bodyPr anchorCtr="0" anchor="ctr" bIns="91425" lIns="91425" spcFirstLastPara="1" rIns="91425" wrap="square" tIns="91425">
-            <a:noAutofit/>
-          </a:bodyPr>
-          <a:lstStyle/>
-          <a:p>
-            <a:pPr indent="0" lvl="0" marL="0" rtl="0" algn="l">
-              <a:spcBef>
-                <a:spcPts val="0"/>
-              </a:spcBef>
-              <a:spcAft>
-                <a:spcPts val="0"/>
-              </a:spcAft>
-              <a:buNone/>
-            </a:pPr>
-            <a:r>
-              <a:t/>
-            </a:r>
-            <a:endParaRPr/>
-          </a:p>
-        </p:txBody>
-      </p:sp>
-      <p:sp>
-        <p:nvSpPr>
-          <p:cNvPr id="399" name="Google Shape;399;p46"/>
+          <p:cNvPr id="396" name="Google Shape;396;p46"/>
           <p:cNvSpPr txBox="1"/>
           <p:nvPr>
             <p:ph type="ctrTitle"/>
@@ -17503,8 +18085,8 @@
         </p:nvSpPr>
         <p:spPr>
           <a:xfrm>
-            <a:off x="2030800" y="621675"/>
-            <a:ext cx="4961400" cy="441000"/>
+            <a:off x="1768350" y="617900"/>
+            <a:ext cx="5607300" cy="441000"/>
           </a:xfrm>
           <a:prstGeom prst="rect">
             <a:avLst/>
@@ -17528,7 +18110,7 @@
             </a:pPr>
             <a:r>
               <a:rPr b="1" lang="pt-BR" sz="2200"/>
-              <a:t>O que é Release e como funciona?</a:t>
+              <a:t>Aprovando um pull request</a:t>
             </a:r>
             <a:endParaRPr b="1" sz="2200"/>
           </a:p>
@@ -17536,7 +18118,7 @@
       </p:sp>
       <p:sp>
         <p:nvSpPr>
-          <p:cNvPr id="400" name="Google Shape;400;p46"/>
+          <p:cNvPr id="397" name="Google Shape;397;p46"/>
           <p:cNvSpPr txBox="1"/>
           <p:nvPr/>
         </p:nvSpPr>
@@ -17574,7 +18156,7 @@
                   <a:schemeClr val="dk1"/>
                 </a:solidFill>
               </a:rPr>
-              <a:t>Módulo 7: Tags e Releases</a:t>
+              <a:t>Módulo 6: Pull request</a:t>
             </a:r>
             <a:endParaRPr b="1" sz="1200">
               <a:solidFill>
@@ -17586,7 +18168,7 @@
       </p:sp>
       <p:pic>
         <p:nvPicPr>
-          <p:cNvPr id="401" name="Google Shape;401;p46"/>
+          <p:cNvPr id="398" name="Google Shape;398;p46"/>
           <p:cNvPicPr preferRelativeResize="0"/>
           <p:nvPr/>
         </p:nvPicPr>
@@ -17600,36 +18182,8 @@
         </p:blipFill>
         <p:spPr>
           <a:xfrm>
-            <a:off x="1348125" y="2450775"/>
-            <a:ext cx="6460001" cy="2555275"/>
-          </a:xfrm>
-          <a:prstGeom prst="rect">
-            <a:avLst/>
-          </a:prstGeom>
-          <a:noFill/>
-          <a:ln>
-            <a:noFill/>
-          </a:ln>
-        </p:spPr>
-      </p:pic>
-      <p:pic>
-        <p:nvPicPr>
-          <p:cNvPr id="402" name="Google Shape;402;p46"/>
-          <p:cNvPicPr preferRelativeResize="0"/>
-          <p:nvPr/>
-        </p:nvPicPr>
-        <p:blipFill>
-          <a:blip r:embed="rId4">
-            <a:alphaModFix/>
-          </a:blip>
-          <a:stretch>
-            <a:fillRect/>
-          </a:stretch>
-        </p:blipFill>
-        <p:spPr>
-          <a:xfrm>
-            <a:off x="3201220" y="1235895"/>
-            <a:ext cx="2714802" cy="1006862"/>
+            <a:off x="1690700" y="1194225"/>
+            <a:ext cx="5762625" cy="3743325"/>
           </a:xfrm>
           <a:prstGeom prst="rect">
             <a:avLst/>
@@ -17653,7 +18207,7 @@
   <p:cSld>
     <p:spTree>
       <p:nvGrpSpPr>
-        <p:cNvPr id="406" name="Shape 406"/>
+        <p:cNvPr id="402" name="Shape 402"/>
         <p:cNvGrpSpPr/>
         <p:nvPr/>
       </p:nvGrpSpPr>
@@ -17667,7 +18221,7 @@
       </p:grpSpPr>
       <p:sp>
         <p:nvSpPr>
-          <p:cNvPr id="407" name="Google Shape;407;p47"/>
+          <p:cNvPr id="403" name="Google Shape;403;p47"/>
           <p:cNvSpPr/>
           <p:nvPr/>
         </p:nvSpPr>
@@ -17716,14 +18270,14 @@
       </p:sp>
       <p:sp>
         <p:nvSpPr>
-          <p:cNvPr id="408" name="Google Shape;408;p47"/>
+          <p:cNvPr id="404" name="Google Shape;404;p47"/>
           <p:cNvSpPr/>
           <p:nvPr/>
         </p:nvSpPr>
         <p:spPr>
           <a:xfrm>
-            <a:off x="5329113" y="1953800"/>
-            <a:ext cx="3683700" cy="2148300"/>
+            <a:off x="6213763" y="1941575"/>
+            <a:ext cx="2673900" cy="2244000"/>
           </a:xfrm>
           <a:prstGeom prst="rect">
             <a:avLst/>
@@ -17765,14 +18319,14 @@
       </p:sp>
       <p:sp>
         <p:nvSpPr>
-          <p:cNvPr id="409" name="Google Shape;409;p47"/>
+          <p:cNvPr id="405" name="Google Shape;405;p47"/>
           <p:cNvSpPr/>
           <p:nvPr/>
         </p:nvSpPr>
         <p:spPr>
           <a:xfrm>
-            <a:off x="131187" y="1009187"/>
-            <a:ext cx="5114700" cy="4037700"/>
+            <a:off x="291500" y="1162025"/>
+            <a:ext cx="5682600" cy="3803100"/>
           </a:xfrm>
           <a:prstGeom prst="rect">
             <a:avLst/>
@@ -17814,7 +18368,7 @@
       </p:sp>
       <p:sp>
         <p:nvSpPr>
-          <p:cNvPr id="410" name="Google Shape;410;p47"/>
+          <p:cNvPr id="406" name="Google Shape;406;p47"/>
           <p:cNvSpPr txBox="1"/>
           <p:nvPr>
             <p:ph type="ctrTitle"/>
@@ -17822,8 +18376,8 @@
         </p:nvSpPr>
         <p:spPr>
           <a:xfrm>
-            <a:off x="2654550" y="568175"/>
-            <a:ext cx="3834900" cy="441000"/>
+            <a:off x="1768350" y="617900"/>
+            <a:ext cx="5607300" cy="441000"/>
           </a:xfrm>
           <a:prstGeom prst="rect">
             <a:avLst/>
@@ -17847,7 +18401,7 @@
             </a:pPr>
             <a:r>
               <a:rPr b="1" lang="pt-BR" sz="2200"/>
-              <a:t>Criando um Release</a:t>
+              <a:t>Realizando o merge do pull request</a:t>
             </a:r>
             <a:endParaRPr b="1" sz="2200"/>
           </a:p>
@@ -17855,7 +18409,7 @@
       </p:sp>
       <p:sp>
         <p:nvSpPr>
-          <p:cNvPr id="411" name="Google Shape;411;p47"/>
+          <p:cNvPr id="407" name="Google Shape;407;p47"/>
           <p:cNvSpPr txBox="1"/>
           <p:nvPr/>
         </p:nvSpPr>
@@ -17893,7 +18447,7 @@
                   <a:schemeClr val="dk1"/>
                 </a:solidFill>
               </a:rPr>
-              <a:t>Módulo 7: Tags e Releases</a:t>
+              <a:t>Módulo 6: Pull request</a:t>
             </a:r>
             <a:endParaRPr b="1" sz="1200">
               <a:solidFill>
@@ -17905,7 +18459,7 @@
       </p:sp>
       <p:pic>
         <p:nvPicPr>
-          <p:cNvPr id="412" name="Google Shape;412;p47"/>
+          <p:cNvPr id="408" name="Google Shape;408;p47"/>
           <p:cNvPicPr preferRelativeResize="0"/>
           <p:nvPr/>
         </p:nvPicPr>
@@ -17919,8 +18473,8 @@
         </p:blipFill>
         <p:spPr>
           <a:xfrm>
-            <a:off x="5352412" y="2000312"/>
-            <a:ext cx="3622550" cy="2074575"/>
+            <a:off x="329150" y="1196025"/>
+            <a:ext cx="5607300" cy="3735111"/>
           </a:xfrm>
           <a:prstGeom prst="rect">
             <a:avLst/>
@@ -17933,7 +18487,7 @@
       </p:pic>
       <p:pic>
         <p:nvPicPr>
-          <p:cNvPr id="413" name="Google Shape;413;p47"/>
+          <p:cNvPr id="409" name="Google Shape;409;p47"/>
           <p:cNvPicPr preferRelativeResize="0"/>
           <p:nvPr/>
         </p:nvPicPr>
@@ -17947,8 +18501,8 @@
         </p:blipFill>
         <p:spPr>
           <a:xfrm>
-            <a:off x="156693" y="1040346"/>
-            <a:ext cx="5063681" cy="3975232"/>
+            <a:off x="6224725" y="1941575"/>
+            <a:ext cx="2651993" cy="2244000"/>
           </a:xfrm>
           <a:prstGeom prst="rect">
             <a:avLst/>
@@ -17972,7 +18526,7 @@
   <p:cSld>
     <p:spTree>
       <p:nvGrpSpPr>
-        <p:cNvPr id="417" name="Shape 417"/>
+        <p:cNvPr id="413" name="Shape 413"/>
         <p:cNvGrpSpPr/>
         <p:nvPr/>
       </p:nvGrpSpPr>
@@ -17986,7 +18540,7 @@
       </p:grpSpPr>
       <p:sp>
         <p:nvSpPr>
-          <p:cNvPr id="418" name="Google Shape;418;p48"/>
+          <p:cNvPr id="414" name="Google Shape;414;p48"/>
           <p:cNvSpPr/>
           <p:nvPr/>
         </p:nvSpPr>
@@ -18035,14 +18589,14 @@
       </p:sp>
       <p:sp>
         <p:nvSpPr>
-          <p:cNvPr id="419" name="Google Shape;419;p48"/>
+          <p:cNvPr id="415" name="Google Shape;415;p48"/>
           <p:cNvSpPr/>
           <p:nvPr/>
         </p:nvSpPr>
         <p:spPr>
           <a:xfrm>
-            <a:off x="171300" y="1453800"/>
-            <a:ext cx="8801400" cy="3228300"/>
+            <a:off x="4695125" y="1799378"/>
+            <a:ext cx="4286700" cy="2296800"/>
           </a:xfrm>
           <a:prstGeom prst="rect">
             <a:avLst/>
@@ -18084,7 +18638,56 @@
       </p:sp>
       <p:sp>
         <p:nvSpPr>
-          <p:cNvPr id="420" name="Google Shape;420;p48"/>
+          <p:cNvPr id="416" name="Google Shape;416;p48"/>
+          <p:cNvSpPr/>
+          <p:nvPr/>
+        </p:nvSpPr>
+        <p:spPr>
+          <a:xfrm>
+            <a:off x="181500" y="1277863"/>
+            <a:ext cx="4390500" cy="3339600"/>
+          </a:xfrm>
+          <a:prstGeom prst="rect">
+            <a:avLst/>
+          </a:prstGeom>
+          <a:solidFill>
+            <a:schemeClr val="lt1"/>
+          </a:solidFill>
+          <a:ln cap="flat" cmpd="sng" w="9525">
+            <a:solidFill>
+              <a:schemeClr val="dk2"/>
+            </a:solidFill>
+            <a:prstDash val="solid"/>
+            <a:round/>
+            <a:headEnd len="sm" w="sm" type="none"/>
+            <a:tailEnd len="sm" w="sm" type="none"/>
+          </a:ln>
+        </p:spPr>
+        <p:txBody>
+          <a:bodyPr anchorCtr="0" anchor="ctr" bIns="91425" lIns="91425" spcFirstLastPara="1" rIns="91425" wrap="square" tIns="91425">
+            <a:noAutofit/>
+          </a:bodyPr>
+          <a:lstStyle/>
+          <a:p>
+            <a:pPr indent="0" lvl="0" marL="0" rtl="0" algn="l">
+              <a:spcBef>
+                <a:spcPts val="0"/>
+              </a:spcBef>
+              <a:spcAft>
+                <a:spcPts val="0"/>
+              </a:spcAft>
+              <a:buNone/>
+            </a:pPr>
+            <a:r>
+              <a:t/>
+            </a:r>
+            <a:endParaRPr/>
+          </a:p>
+        </p:txBody>
+      </p:sp>
+      <p:sp>
+        <p:nvSpPr>
+          <p:cNvPr id="417" name="Google Shape;417;p48"/>
           <p:cNvSpPr txBox="1"/>
           <p:nvPr>
             <p:ph type="ctrTitle"/>
@@ -18092,8 +18695,8 @@
         </p:nvSpPr>
         <p:spPr>
           <a:xfrm>
-            <a:off x="3150138" y="749700"/>
-            <a:ext cx="2843700" cy="441000"/>
+            <a:off x="2226450" y="613550"/>
+            <a:ext cx="4691100" cy="441000"/>
           </a:xfrm>
           <a:prstGeom prst="rect">
             <a:avLst/>
@@ -18117,7 +18720,7 @@
             </a:pPr>
             <a:r>
               <a:rPr b="1" lang="pt-BR" sz="2200"/>
-              <a:t>Release criado</a:t>
+              <a:t>O que é Tag e como funciona?</a:t>
             </a:r>
             <a:endParaRPr b="1" sz="2200"/>
           </a:p>
@@ -18125,7 +18728,7 @@
       </p:sp>
       <p:sp>
         <p:nvSpPr>
-          <p:cNvPr id="421" name="Google Shape;421;p48"/>
+          <p:cNvPr id="418" name="Google Shape;418;p48"/>
           <p:cNvSpPr txBox="1"/>
           <p:nvPr/>
         </p:nvSpPr>
@@ -18163,7 +18766,7 @@
                   <a:schemeClr val="dk1"/>
                 </a:solidFill>
               </a:rPr>
-              <a:t>Módulo 7: Tags e Releases</a:t>
+              <a:t>Módulo 7: Tag e Releases</a:t>
             </a:r>
             <a:endParaRPr b="1" sz="1200">
               <a:solidFill>
@@ -18175,7 +18778,7 @@
       </p:sp>
       <p:pic>
         <p:nvPicPr>
-          <p:cNvPr id="422" name="Google Shape;422;p48"/>
+          <p:cNvPr id="419" name="Google Shape;419;p48"/>
           <p:cNvPicPr preferRelativeResize="0"/>
           <p:nvPr/>
         </p:nvPicPr>
@@ -18189,8 +18792,36 @@
         </p:blipFill>
         <p:spPr>
           <a:xfrm>
-            <a:off x="209914" y="1497334"/>
-            <a:ext cx="8724072" cy="3141336"/>
+            <a:off x="204763" y="1277850"/>
+            <a:ext cx="4343975" cy="3339723"/>
+          </a:xfrm>
+          <a:prstGeom prst="rect">
+            <a:avLst/>
+          </a:prstGeom>
+          <a:noFill/>
+          <a:ln>
+            <a:noFill/>
+          </a:ln>
+        </p:spPr>
+      </p:pic>
+      <p:pic>
+        <p:nvPicPr>
+          <p:cNvPr id="420" name="Google Shape;420;p48"/>
+          <p:cNvPicPr preferRelativeResize="0"/>
+          <p:nvPr/>
+        </p:nvPicPr>
+        <p:blipFill>
+          <a:blip r:embed="rId4">
+            <a:alphaModFix/>
+          </a:blip>
+          <a:stretch>
+            <a:fillRect/>
+          </a:stretch>
+        </p:blipFill>
+        <p:spPr>
+          <a:xfrm>
+            <a:off x="4695125" y="1799275"/>
+            <a:ext cx="4286522" cy="2296874"/>
           </a:xfrm>
           <a:prstGeom prst="rect">
             <a:avLst/>
@@ -18214,7 +18845,7 @@
   <p:cSld>
     <p:spTree>
       <p:nvGrpSpPr>
-        <p:cNvPr id="426" name="Shape 426"/>
+        <p:cNvPr id="424" name="Shape 424"/>
         <p:cNvGrpSpPr/>
         <p:nvPr/>
       </p:nvGrpSpPr>
@@ -18228,7 +18859,7 @@
       </p:grpSpPr>
       <p:sp>
         <p:nvSpPr>
-          <p:cNvPr id="427" name="Google Shape;427;p49"/>
+          <p:cNvPr id="425" name="Google Shape;425;p49"/>
           <p:cNvSpPr/>
           <p:nvPr/>
         </p:nvSpPr>
@@ -18277,14 +18908,14 @@
       </p:sp>
       <p:sp>
         <p:nvSpPr>
-          <p:cNvPr id="428" name="Google Shape;428;p49"/>
+          <p:cNvPr id="426" name="Google Shape;426;p49"/>
           <p:cNvSpPr/>
           <p:nvPr/>
         </p:nvSpPr>
         <p:spPr>
           <a:xfrm>
-            <a:off x="120600" y="1431175"/>
-            <a:ext cx="8902800" cy="3063300"/>
+            <a:off x="1322250" y="2412900"/>
+            <a:ext cx="6527700" cy="2632200"/>
           </a:xfrm>
           <a:prstGeom prst="rect">
             <a:avLst/>
@@ -18326,7 +18957,56 @@
       </p:sp>
       <p:sp>
         <p:nvSpPr>
-          <p:cNvPr id="429" name="Google Shape;429;p49"/>
+          <p:cNvPr id="427" name="Google Shape;427;p49"/>
+          <p:cNvSpPr/>
+          <p:nvPr/>
+        </p:nvSpPr>
+        <p:spPr>
+          <a:xfrm>
+            <a:off x="3146850" y="1169586"/>
+            <a:ext cx="2850300" cy="1136400"/>
+          </a:xfrm>
+          <a:prstGeom prst="rect">
+            <a:avLst/>
+          </a:prstGeom>
+          <a:solidFill>
+            <a:schemeClr val="lt1"/>
+          </a:solidFill>
+          <a:ln cap="flat" cmpd="sng" w="9525">
+            <a:solidFill>
+              <a:schemeClr val="dk2"/>
+            </a:solidFill>
+            <a:prstDash val="solid"/>
+            <a:round/>
+            <a:headEnd len="sm" w="sm" type="none"/>
+            <a:tailEnd len="sm" w="sm" type="none"/>
+          </a:ln>
+        </p:spPr>
+        <p:txBody>
+          <a:bodyPr anchorCtr="0" anchor="ctr" bIns="91425" lIns="91425" spcFirstLastPara="1" rIns="91425" wrap="square" tIns="91425">
+            <a:noAutofit/>
+          </a:bodyPr>
+          <a:lstStyle/>
+          <a:p>
+            <a:pPr indent="0" lvl="0" marL="0" rtl="0" algn="l">
+              <a:spcBef>
+                <a:spcPts val="0"/>
+              </a:spcBef>
+              <a:spcAft>
+                <a:spcPts val="0"/>
+              </a:spcAft>
+              <a:buNone/>
+            </a:pPr>
+            <a:r>
+              <a:t/>
+            </a:r>
+            <a:endParaRPr/>
+          </a:p>
+        </p:txBody>
+      </p:sp>
+      <p:sp>
+        <p:nvSpPr>
+          <p:cNvPr id="428" name="Google Shape;428;p49"/>
           <p:cNvSpPr txBox="1"/>
           <p:nvPr>
             <p:ph type="ctrTitle"/>
@@ -18334,8 +19014,8 @@
         </p:nvSpPr>
         <p:spPr>
           <a:xfrm>
-            <a:off x="2226450" y="628700"/>
-            <a:ext cx="4691100" cy="441000"/>
+            <a:off x="2030800" y="621675"/>
+            <a:ext cx="4961400" cy="441000"/>
           </a:xfrm>
           <a:prstGeom prst="rect">
             <a:avLst/>
@@ -18359,7 +19039,7 @@
             </a:pPr>
             <a:r>
               <a:rPr b="1" lang="pt-BR" sz="2200"/>
-              <a:t>O que são Issues?</a:t>
+              <a:t>O que é Release e como funciona?</a:t>
             </a:r>
             <a:endParaRPr b="1" sz="2200"/>
           </a:p>
@@ -18367,7 +19047,7 @@
       </p:sp>
       <p:sp>
         <p:nvSpPr>
-          <p:cNvPr id="430" name="Google Shape;430;p49"/>
+          <p:cNvPr id="429" name="Google Shape;429;p49"/>
           <p:cNvSpPr txBox="1"/>
           <p:nvPr/>
         </p:nvSpPr>
@@ -18405,7 +19085,7 @@
                   <a:schemeClr val="dk1"/>
                 </a:solidFill>
               </a:rPr>
-              <a:t>Módulo 8: Issues</a:t>
+              <a:t>Módulo 7: Tags e Releases</a:t>
             </a:r>
             <a:endParaRPr b="1" sz="1200">
               <a:solidFill>
@@ -18417,7 +19097,7 @@
       </p:sp>
       <p:pic>
         <p:nvPicPr>
-          <p:cNvPr id="431" name="Google Shape;431;p49"/>
+          <p:cNvPr id="430" name="Google Shape;430;p49"/>
           <p:cNvPicPr preferRelativeResize="0"/>
           <p:nvPr/>
         </p:nvPicPr>
@@ -18431,8 +19111,36 @@
         </p:blipFill>
         <p:spPr>
           <a:xfrm>
-            <a:off x="152400" y="1471700"/>
-            <a:ext cx="8839198" cy="2982239"/>
+            <a:off x="1348125" y="2450775"/>
+            <a:ext cx="6460001" cy="2555275"/>
+          </a:xfrm>
+          <a:prstGeom prst="rect">
+            <a:avLst/>
+          </a:prstGeom>
+          <a:noFill/>
+          <a:ln>
+            <a:noFill/>
+          </a:ln>
+        </p:spPr>
+      </p:pic>
+      <p:pic>
+        <p:nvPicPr>
+          <p:cNvPr id="431" name="Google Shape;431;p49"/>
+          <p:cNvPicPr preferRelativeResize="0"/>
+          <p:nvPr/>
+        </p:nvPicPr>
+        <p:blipFill>
+          <a:blip r:embed="rId4">
+            <a:alphaModFix/>
+          </a:blip>
+          <a:stretch>
+            <a:fillRect/>
+          </a:stretch>
+        </p:blipFill>
+        <p:spPr>
+          <a:xfrm>
+            <a:off x="3201220" y="1235895"/>
+            <a:ext cx="2714802" cy="1006862"/>
           </a:xfrm>
           <a:prstGeom prst="rect">
             <a:avLst/>
@@ -18525,8 +19233,8 @@
         </p:nvSpPr>
         <p:spPr>
           <a:xfrm>
-            <a:off x="249300" y="1119475"/>
-            <a:ext cx="8645400" cy="3927300"/>
+            <a:off x="5329113" y="1953800"/>
+            <a:ext cx="3683700" cy="2148300"/>
           </a:xfrm>
           <a:prstGeom prst="rect">
             <a:avLst/>
@@ -18569,6 +19277,55 @@
       <p:sp>
         <p:nvSpPr>
           <p:cNvPr id="438" name="Google Shape;438;p50"/>
+          <p:cNvSpPr/>
+          <p:nvPr/>
+        </p:nvSpPr>
+        <p:spPr>
+          <a:xfrm>
+            <a:off x="131187" y="1009187"/>
+            <a:ext cx="5114700" cy="4037700"/>
+          </a:xfrm>
+          <a:prstGeom prst="rect">
+            <a:avLst/>
+          </a:prstGeom>
+          <a:solidFill>
+            <a:schemeClr val="lt1"/>
+          </a:solidFill>
+          <a:ln cap="flat" cmpd="sng" w="9525">
+            <a:solidFill>
+              <a:schemeClr val="dk2"/>
+            </a:solidFill>
+            <a:prstDash val="solid"/>
+            <a:round/>
+            <a:headEnd len="sm" w="sm" type="none"/>
+            <a:tailEnd len="sm" w="sm" type="none"/>
+          </a:ln>
+        </p:spPr>
+        <p:txBody>
+          <a:bodyPr anchorCtr="0" anchor="ctr" bIns="91425" lIns="91425" spcFirstLastPara="1" rIns="91425" wrap="square" tIns="91425">
+            <a:noAutofit/>
+          </a:bodyPr>
+          <a:lstStyle/>
+          <a:p>
+            <a:pPr indent="0" lvl="0" marL="0" rtl="0" algn="l">
+              <a:spcBef>
+                <a:spcPts val="0"/>
+              </a:spcBef>
+              <a:spcAft>
+                <a:spcPts val="0"/>
+              </a:spcAft>
+              <a:buNone/>
+            </a:pPr>
+            <a:r>
+              <a:t/>
+            </a:r>
+            <a:endParaRPr/>
+          </a:p>
+        </p:txBody>
+      </p:sp>
+      <p:sp>
+        <p:nvSpPr>
+          <p:cNvPr id="439" name="Google Shape;439;p50"/>
           <p:cNvSpPr txBox="1"/>
           <p:nvPr>
             <p:ph type="ctrTitle"/>
@@ -18576,8 +19333,8 @@
         </p:nvSpPr>
         <p:spPr>
           <a:xfrm>
-            <a:off x="2226450" y="568175"/>
-            <a:ext cx="4691100" cy="441000"/>
+            <a:off x="2654550" y="568175"/>
+            <a:ext cx="3834900" cy="441000"/>
           </a:xfrm>
           <a:prstGeom prst="rect">
             <a:avLst/>
@@ -18601,7 +19358,7 @@
             </a:pPr>
             <a:r>
               <a:rPr b="1" lang="pt-BR" sz="2200"/>
-              <a:t>Criando uma Issue</a:t>
+              <a:t>Criando um Release</a:t>
             </a:r>
             <a:endParaRPr b="1" sz="2200"/>
           </a:p>
@@ -18609,7 +19366,7 @@
       </p:sp>
       <p:sp>
         <p:nvSpPr>
-          <p:cNvPr id="439" name="Google Shape;439;p50"/>
+          <p:cNvPr id="440" name="Google Shape;440;p50"/>
           <p:cNvSpPr txBox="1"/>
           <p:nvPr/>
         </p:nvSpPr>
@@ -18647,7 +19404,7 @@
                   <a:schemeClr val="dk1"/>
                 </a:solidFill>
               </a:rPr>
-              <a:t>Módulo 8: Issues</a:t>
+              <a:t>Módulo 7: Tags e Releases</a:t>
             </a:r>
             <a:endParaRPr b="1" sz="1200">
               <a:solidFill>
@@ -18659,7 +19416,7 @@
       </p:sp>
       <p:pic>
         <p:nvPicPr>
-          <p:cNvPr id="440" name="Google Shape;440;p50"/>
+          <p:cNvPr id="441" name="Google Shape;441;p50"/>
           <p:cNvPicPr preferRelativeResize="0"/>
           <p:nvPr/>
         </p:nvPicPr>
@@ -18673,8 +19430,36 @@
         </p:blipFill>
         <p:spPr>
           <a:xfrm>
-            <a:off x="288255" y="1157334"/>
-            <a:ext cx="8567342" cy="3851557"/>
+            <a:off x="5352412" y="2000312"/>
+            <a:ext cx="3622550" cy="2074575"/>
+          </a:xfrm>
+          <a:prstGeom prst="rect">
+            <a:avLst/>
+          </a:prstGeom>
+          <a:noFill/>
+          <a:ln>
+            <a:noFill/>
+          </a:ln>
+        </p:spPr>
+      </p:pic>
+      <p:pic>
+        <p:nvPicPr>
+          <p:cNvPr id="442" name="Google Shape;442;p50"/>
+          <p:cNvPicPr preferRelativeResize="0"/>
+          <p:nvPr/>
+        </p:nvPicPr>
+        <p:blipFill>
+          <a:blip r:embed="rId4">
+            <a:alphaModFix/>
+          </a:blip>
+          <a:stretch>
+            <a:fillRect/>
+          </a:stretch>
+        </p:blipFill>
+        <p:spPr>
+          <a:xfrm>
+            <a:off x="156693" y="1040346"/>
+            <a:ext cx="5063681" cy="3975232"/>
           </a:xfrm>
           <a:prstGeom prst="rect">
             <a:avLst/>
@@ -18698,7 +19483,7 @@
   <p:cSld>
     <p:spTree>
       <p:nvGrpSpPr>
-        <p:cNvPr id="444" name="Shape 444"/>
+        <p:cNvPr id="446" name="Shape 446"/>
         <p:cNvGrpSpPr/>
         <p:nvPr/>
       </p:nvGrpSpPr>
@@ -18712,7 +19497,7 @@
       </p:grpSpPr>
       <p:sp>
         <p:nvSpPr>
-          <p:cNvPr id="445" name="Google Shape;445;p51"/>
+          <p:cNvPr id="447" name="Google Shape;447;p51"/>
           <p:cNvSpPr/>
           <p:nvPr/>
         </p:nvSpPr>
@@ -18761,14 +19546,14 @@
       </p:sp>
       <p:sp>
         <p:nvSpPr>
-          <p:cNvPr id="446" name="Google Shape;446;p51"/>
+          <p:cNvPr id="448" name="Google Shape;448;p51"/>
           <p:cNvSpPr/>
           <p:nvPr/>
         </p:nvSpPr>
         <p:spPr>
           <a:xfrm>
-            <a:off x="105450" y="2314550"/>
-            <a:ext cx="8933100" cy="1588500"/>
+            <a:off x="171300" y="1453800"/>
+            <a:ext cx="8801400" cy="3228300"/>
           </a:xfrm>
           <a:prstGeom prst="rect">
             <a:avLst/>
@@ -18810,7 +19595,7 @@
       </p:sp>
       <p:sp>
         <p:nvSpPr>
-          <p:cNvPr id="447" name="Google Shape;447;p51"/>
+          <p:cNvPr id="449" name="Google Shape;449;p51"/>
           <p:cNvSpPr txBox="1"/>
           <p:nvPr>
             <p:ph type="ctrTitle"/>
@@ -18818,8 +19603,8 @@
         </p:nvSpPr>
         <p:spPr>
           <a:xfrm>
-            <a:off x="1353750" y="908575"/>
-            <a:ext cx="6436500" cy="441000"/>
+            <a:off x="3150138" y="749700"/>
+            <a:ext cx="2843700" cy="441000"/>
           </a:xfrm>
           <a:prstGeom prst="rect">
             <a:avLst/>
@@ -18843,7 +19628,7 @@
             </a:pPr>
             <a:r>
               <a:rPr b="1" lang="pt-BR" sz="2200"/>
-              <a:t>Designando um colaborador para uma issue</a:t>
+              <a:t>Release criado</a:t>
             </a:r>
             <a:endParaRPr b="1" sz="2200"/>
           </a:p>
@@ -18851,7 +19636,7 @@
       </p:sp>
       <p:sp>
         <p:nvSpPr>
-          <p:cNvPr id="448" name="Google Shape;448;p51"/>
+          <p:cNvPr id="450" name="Google Shape;450;p51"/>
           <p:cNvSpPr txBox="1"/>
           <p:nvPr/>
         </p:nvSpPr>
@@ -18889,7 +19674,7 @@
                   <a:schemeClr val="dk1"/>
                 </a:solidFill>
               </a:rPr>
-              <a:t>Módulo 8: Issues</a:t>
+              <a:t>Módulo 7: Tags e Releases</a:t>
             </a:r>
             <a:endParaRPr b="1" sz="1200">
               <a:solidFill>
@@ -18901,7 +19686,7 @@
       </p:sp>
       <p:pic>
         <p:nvPicPr>
-          <p:cNvPr id="449" name="Google Shape;449;p51"/>
+          <p:cNvPr id="451" name="Google Shape;451;p51"/>
           <p:cNvPicPr preferRelativeResize="0"/>
           <p:nvPr/>
         </p:nvPicPr>
@@ -18915,8 +19700,8 @@
         </p:blipFill>
         <p:spPr>
           <a:xfrm>
-            <a:off x="152400" y="2359225"/>
-            <a:ext cx="8839201" cy="1499147"/>
+            <a:off x="209914" y="1497334"/>
+            <a:ext cx="8724072" cy="3141336"/>
           </a:xfrm>
           <a:prstGeom prst="rect">
             <a:avLst/>
@@ -19173,7 +19958,7 @@
   <p:cSld>
     <p:spTree>
       <p:nvGrpSpPr>
-        <p:cNvPr id="453" name="Shape 453"/>
+        <p:cNvPr id="455" name="Shape 455"/>
         <p:cNvGrpSpPr/>
         <p:nvPr/>
       </p:nvGrpSpPr>
@@ -19187,7 +19972,7 @@
       </p:grpSpPr>
       <p:sp>
         <p:nvSpPr>
-          <p:cNvPr id="454" name="Google Shape;454;p52"/>
+          <p:cNvPr id="456" name="Google Shape;456;p52"/>
           <p:cNvSpPr/>
           <p:nvPr/>
         </p:nvSpPr>
@@ -19236,14 +20021,14 @@
       </p:sp>
       <p:sp>
         <p:nvSpPr>
-          <p:cNvPr id="455" name="Google Shape;455;p52"/>
+          <p:cNvPr id="457" name="Google Shape;457;p52"/>
           <p:cNvSpPr/>
           <p:nvPr/>
         </p:nvSpPr>
         <p:spPr>
           <a:xfrm>
-            <a:off x="1385400" y="1062125"/>
-            <a:ext cx="6373200" cy="4022400"/>
+            <a:off x="120600" y="1431175"/>
+            <a:ext cx="8902800" cy="3063300"/>
           </a:xfrm>
           <a:prstGeom prst="rect">
             <a:avLst/>
@@ -19285,7 +20070,7 @@
       </p:sp>
       <p:sp>
         <p:nvSpPr>
-          <p:cNvPr id="456" name="Google Shape;456;p52"/>
+          <p:cNvPr id="458" name="Google Shape;458;p52"/>
           <p:cNvSpPr txBox="1"/>
           <p:nvPr>
             <p:ph type="ctrTitle"/>
@@ -19293,8 +20078,8 @@
         </p:nvSpPr>
         <p:spPr>
           <a:xfrm>
-            <a:off x="2673600" y="568175"/>
-            <a:ext cx="3796800" cy="441000"/>
+            <a:off x="2226450" y="628700"/>
+            <a:ext cx="4691100" cy="441000"/>
           </a:xfrm>
           <a:prstGeom prst="rect">
             <a:avLst/>
@@ -19318,7 +20103,7 @@
             </a:pPr>
             <a:r>
               <a:rPr b="1" lang="pt-BR" sz="2200"/>
-              <a:t>Fechando uma issue</a:t>
+              <a:t>O que são Issues?</a:t>
             </a:r>
             <a:endParaRPr b="1" sz="2200"/>
           </a:p>
@@ -19326,7 +20111,7 @@
       </p:sp>
       <p:sp>
         <p:nvSpPr>
-          <p:cNvPr id="457" name="Google Shape;457;p52"/>
+          <p:cNvPr id="459" name="Google Shape;459;p52"/>
           <p:cNvSpPr txBox="1"/>
           <p:nvPr/>
         </p:nvSpPr>
@@ -19376,7 +20161,7 @@
       </p:sp>
       <p:pic>
         <p:nvPicPr>
-          <p:cNvPr id="458" name="Google Shape;458;p52"/>
+          <p:cNvPr id="460" name="Google Shape;460;p52"/>
           <p:cNvPicPr preferRelativeResize="0"/>
           <p:nvPr/>
         </p:nvPicPr>
@@ -19390,8 +20175,8 @@
         </p:blipFill>
         <p:spPr>
           <a:xfrm>
-            <a:off x="1430928" y="1107842"/>
-            <a:ext cx="6282019" cy="3931066"/>
+            <a:off x="152400" y="1471700"/>
+            <a:ext cx="8839198" cy="2982239"/>
           </a:xfrm>
           <a:prstGeom prst="rect">
             <a:avLst/>
@@ -19415,7 +20200,7 @@
   <p:cSld>
     <p:spTree>
       <p:nvGrpSpPr>
-        <p:cNvPr id="462" name="Shape 462"/>
+        <p:cNvPr id="464" name="Shape 464"/>
         <p:cNvGrpSpPr/>
         <p:nvPr/>
       </p:nvGrpSpPr>
@@ -19429,7 +20214,7 @@
       </p:grpSpPr>
       <p:sp>
         <p:nvSpPr>
-          <p:cNvPr id="463" name="Google Shape;463;p53"/>
+          <p:cNvPr id="465" name="Google Shape;465;p53"/>
           <p:cNvSpPr/>
           <p:nvPr/>
         </p:nvSpPr>
@@ -19478,14 +20263,14 @@
       </p:sp>
       <p:sp>
         <p:nvSpPr>
-          <p:cNvPr id="464" name="Google Shape;464;p53"/>
+          <p:cNvPr id="466" name="Google Shape;466;p53"/>
           <p:cNvSpPr/>
           <p:nvPr/>
         </p:nvSpPr>
         <p:spPr>
           <a:xfrm>
-            <a:off x="2040300" y="1120075"/>
-            <a:ext cx="5063400" cy="3963000"/>
+            <a:off x="249300" y="1119475"/>
+            <a:ext cx="8645400" cy="3927300"/>
           </a:xfrm>
           <a:prstGeom prst="rect">
             <a:avLst/>
@@ -19527,7 +20312,7 @@
       </p:sp>
       <p:sp>
         <p:nvSpPr>
-          <p:cNvPr id="465" name="Google Shape;465;p53"/>
+          <p:cNvPr id="467" name="Google Shape;467;p53"/>
           <p:cNvSpPr txBox="1"/>
           <p:nvPr>
             <p:ph type="ctrTitle"/>
@@ -19535,8 +20320,8 @@
         </p:nvSpPr>
         <p:spPr>
           <a:xfrm>
-            <a:off x="918900" y="568175"/>
-            <a:ext cx="7306200" cy="441000"/>
+            <a:off x="2226450" y="568175"/>
+            <a:ext cx="4691100" cy="441000"/>
           </a:xfrm>
           <a:prstGeom prst="rect">
             <a:avLst/>
@@ -19560,7 +20345,7 @@
             </a:pPr>
             <a:r>
               <a:rPr b="1" lang="pt-BR" sz="2200"/>
-              <a:t>Exemplos de sintaxes para utilizar nos comentários</a:t>
+              <a:t>Criando uma Issue</a:t>
             </a:r>
             <a:endParaRPr b="1" sz="2200"/>
           </a:p>
@@ -19568,7 +20353,7 @@
       </p:sp>
       <p:sp>
         <p:nvSpPr>
-          <p:cNvPr id="466" name="Google Shape;466;p53"/>
+          <p:cNvPr id="468" name="Google Shape;468;p53"/>
           <p:cNvSpPr txBox="1"/>
           <p:nvPr/>
         </p:nvSpPr>
@@ -19618,7 +20403,7 @@
       </p:sp>
       <p:pic>
         <p:nvPicPr>
-          <p:cNvPr id="467" name="Google Shape;467;p53"/>
+          <p:cNvPr id="469" name="Google Shape;469;p53"/>
           <p:cNvPicPr preferRelativeResize="0"/>
           <p:nvPr/>
         </p:nvPicPr>
@@ -19632,8 +20417,1933 @@
         </p:blipFill>
         <p:spPr>
           <a:xfrm>
+            <a:off x="288255" y="1157334"/>
+            <a:ext cx="8567342" cy="3851557"/>
+          </a:xfrm>
+          <a:prstGeom prst="rect">
+            <a:avLst/>
+          </a:prstGeom>
+          <a:noFill/>
+          <a:ln>
+            <a:noFill/>
+          </a:ln>
+        </p:spPr>
+      </p:pic>
+    </p:spTree>
+  </p:cSld>
+  <p:clrMapOvr>
+    <a:masterClrMapping/>
+  </p:clrMapOvr>
+</p:sld>
+</file>
+
+<file path=ppt/slides/slide42.xml><?xml version="1.0" encoding="utf-8"?>
+<p:sld xmlns:a="http://schemas.openxmlformats.org/drawingml/2006/main" xmlns:r="http://schemas.openxmlformats.org/officeDocument/2006/relationships" xmlns:mc="http://schemas.openxmlformats.org/markup-compatibility/2006" xmlns:mv="urn:schemas-microsoft-com:mac:vml" xmlns:p="http://schemas.openxmlformats.org/presentationml/2006/main" xmlns:c="http://schemas.openxmlformats.org/drawingml/2006/chart" xmlns:dgm="http://schemas.openxmlformats.org/drawingml/2006/diagram" xmlns:o="urn:schemas-microsoft-com:office:office" xmlns:v="urn:schemas-microsoft-com:vml" xmlns:pvml="urn:schemas-microsoft-com:office:powerpoint" xmlns:com="http://schemas.openxmlformats.org/drawingml/2006/compatibility" xmlns:p14="http://schemas.microsoft.com/office/powerpoint/2010/main" xmlns:p15="http://schemas.microsoft.com/office/powerpoint/2012/main" xmlns:ahyp="http://schemas.microsoft.com/office/drawing/2018/hyperlinkcolor">
+  <p:cSld>
+    <p:spTree>
+      <p:nvGrpSpPr>
+        <p:cNvPr id="473" name="Shape 473"/>
+        <p:cNvGrpSpPr/>
+        <p:nvPr/>
+      </p:nvGrpSpPr>
+      <p:grpSpPr>
+        <a:xfrm>
+          <a:off x="0" y="0"/>
+          <a:ext cx="0" cy="0"/>
+          <a:chOff x="0" y="0"/>
+          <a:chExt cx="0" cy="0"/>
+        </a:xfrm>
+      </p:grpSpPr>
+      <p:sp>
+        <p:nvSpPr>
+          <p:cNvPr id="474" name="Google Shape;474;p54"/>
+          <p:cNvSpPr/>
+          <p:nvPr/>
+        </p:nvSpPr>
+        <p:spPr>
+          <a:xfrm>
+            <a:off x="18488" y="18913"/>
+            <a:ext cx="9107025" cy="5105675"/>
+          </a:xfrm>
+          <a:prstGeom prst="flowChartProcess">
+            <a:avLst/>
+          </a:prstGeom>
+          <a:solidFill>
+            <a:schemeClr val="lt1"/>
+          </a:solidFill>
+          <a:ln cap="flat" cmpd="sng" w="9525">
+            <a:solidFill>
+              <a:schemeClr val="dk2"/>
+            </a:solidFill>
+            <a:prstDash val="solid"/>
+            <a:round/>
+            <a:headEnd len="sm" w="sm" type="none"/>
+            <a:tailEnd len="sm" w="sm" type="none"/>
+          </a:ln>
+        </p:spPr>
+        <p:txBody>
+          <a:bodyPr anchorCtr="0" anchor="ctr" bIns="91425" lIns="91425" spcFirstLastPara="1" rIns="91425" wrap="square" tIns="91425">
+            <a:noAutofit/>
+          </a:bodyPr>
+          <a:lstStyle/>
+          <a:p>
+            <a:pPr indent="0" lvl="0" marL="0" rtl="0" algn="l">
+              <a:spcBef>
+                <a:spcPts val="0"/>
+              </a:spcBef>
+              <a:spcAft>
+                <a:spcPts val="0"/>
+              </a:spcAft>
+              <a:buNone/>
+            </a:pPr>
+            <a:r>
+              <a:t/>
+            </a:r>
+            <a:endParaRPr/>
+          </a:p>
+        </p:txBody>
+      </p:sp>
+      <p:sp>
+        <p:nvSpPr>
+          <p:cNvPr id="475" name="Google Shape;475;p54"/>
+          <p:cNvSpPr/>
+          <p:nvPr/>
+        </p:nvSpPr>
+        <p:spPr>
+          <a:xfrm>
+            <a:off x="105450" y="2314550"/>
+            <a:ext cx="8933100" cy="1588500"/>
+          </a:xfrm>
+          <a:prstGeom prst="rect">
+            <a:avLst/>
+          </a:prstGeom>
+          <a:solidFill>
+            <a:schemeClr val="lt1"/>
+          </a:solidFill>
+          <a:ln cap="flat" cmpd="sng" w="9525">
+            <a:solidFill>
+              <a:schemeClr val="dk2"/>
+            </a:solidFill>
+            <a:prstDash val="solid"/>
+            <a:round/>
+            <a:headEnd len="sm" w="sm" type="none"/>
+            <a:tailEnd len="sm" w="sm" type="none"/>
+          </a:ln>
+        </p:spPr>
+        <p:txBody>
+          <a:bodyPr anchorCtr="0" anchor="ctr" bIns="91425" lIns="91425" spcFirstLastPara="1" rIns="91425" wrap="square" tIns="91425">
+            <a:noAutofit/>
+          </a:bodyPr>
+          <a:lstStyle/>
+          <a:p>
+            <a:pPr indent="0" lvl="0" marL="0" rtl="0" algn="l">
+              <a:spcBef>
+                <a:spcPts val="0"/>
+              </a:spcBef>
+              <a:spcAft>
+                <a:spcPts val="0"/>
+              </a:spcAft>
+              <a:buNone/>
+            </a:pPr>
+            <a:r>
+              <a:t/>
+            </a:r>
+            <a:endParaRPr/>
+          </a:p>
+        </p:txBody>
+      </p:sp>
+      <p:sp>
+        <p:nvSpPr>
+          <p:cNvPr id="476" name="Google Shape;476;p54"/>
+          <p:cNvSpPr txBox="1"/>
+          <p:nvPr>
+            <p:ph type="ctrTitle"/>
+          </p:nvPr>
+        </p:nvSpPr>
+        <p:spPr>
+          <a:xfrm>
+            <a:off x="1353750" y="908575"/>
+            <a:ext cx="6436500" cy="441000"/>
+          </a:xfrm>
+          <a:prstGeom prst="rect">
+            <a:avLst/>
+          </a:prstGeom>
+        </p:spPr>
+        <p:txBody>
+          <a:bodyPr anchorCtr="0" anchor="b" bIns="91425" lIns="91425" spcFirstLastPara="1" rIns="91425" wrap="square" tIns="91425">
+            <a:noAutofit/>
+          </a:bodyPr>
+          <a:lstStyle/>
+          <a:p>
+            <a:pPr indent="0" lvl="0" marL="0" rtl="0" algn="ctr">
+              <a:spcBef>
+                <a:spcPts val="0"/>
+              </a:spcBef>
+              <a:spcAft>
+                <a:spcPts val="0"/>
+              </a:spcAft>
+              <a:buSzPts val="990"/>
+              <a:buNone/>
+            </a:pPr>
+            <a:r>
+              <a:rPr b="1" lang="pt-BR" sz="2200"/>
+              <a:t>Designando um colaborador para uma issue</a:t>
+            </a:r>
+            <a:endParaRPr b="1" sz="2200"/>
+          </a:p>
+        </p:txBody>
+      </p:sp>
+      <p:sp>
+        <p:nvSpPr>
+          <p:cNvPr id="477" name="Google Shape;477;p54"/>
+          <p:cNvSpPr txBox="1"/>
+          <p:nvPr/>
+        </p:nvSpPr>
+        <p:spPr>
+          <a:xfrm>
+            <a:off x="5936450" y="198875"/>
+            <a:ext cx="3000000" cy="369300"/>
+          </a:xfrm>
+          <a:prstGeom prst="rect">
+            <a:avLst/>
+          </a:prstGeom>
+          <a:noFill/>
+          <a:ln>
+            <a:noFill/>
+          </a:ln>
+        </p:spPr>
+        <p:txBody>
+          <a:bodyPr anchorCtr="0" anchor="t" bIns="91425" lIns="91425" spcFirstLastPara="1" rIns="91425" wrap="square" tIns="91425">
+            <a:spAutoFit/>
+          </a:bodyPr>
+          <a:lstStyle/>
+          <a:p>
+            <a:pPr indent="0" lvl="0" marL="0" rtl="0" algn="ctr">
+              <a:spcBef>
+                <a:spcPts val="0"/>
+              </a:spcBef>
+              <a:spcAft>
+                <a:spcPts val="0"/>
+              </a:spcAft>
+              <a:buNone/>
+            </a:pPr>
+            <a:r>
+              <a:rPr b="1" lang="pt-BR" sz="1200">
+                <a:solidFill>
+                  <a:schemeClr val="dk1"/>
+                </a:solidFill>
+              </a:rPr>
+              <a:t>Módulo 8: Issues</a:t>
+            </a:r>
+            <a:endParaRPr b="1" sz="1200">
+              <a:solidFill>
+                <a:schemeClr val="dk1"/>
+              </a:solidFill>
+            </a:endParaRPr>
+          </a:p>
+        </p:txBody>
+      </p:sp>
+      <p:pic>
+        <p:nvPicPr>
+          <p:cNvPr id="478" name="Google Shape;478;p54"/>
+          <p:cNvPicPr preferRelativeResize="0"/>
+          <p:nvPr/>
+        </p:nvPicPr>
+        <p:blipFill>
+          <a:blip r:embed="rId3">
+            <a:alphaModFix/>
+          </a:blip>
+          <a:stretch>
+            <a:fillRect/>
+          </a:stretch>
+        </p:blipFill>
+        <p:spPr>
+          <a:xfrm>
+            <a:off x="152400" y="2359225"/>
+            <a:ext cx="8839201" cy="1499147"/>
+          </a:xfrm>
+          <a:prstGeom prst="rect">
+            <a:avLst/>
+          </a:prstGeom>
+          <a:noFill/>
+          <a:ln>
+            <a:noFill/>
+          </a:ln>
+        </p:spPr>
+      </p:pic>
+    </p:spTree>
+  </p:cSld>
+  <p:clrMapOvr>
+    <a:masterClrMapping/>
+  </p:clrMapOvr>
+</p:sld>
+</file>
+
+<file path=ppt/slides/slide43.xml><?xml version="1.0" encoding="utf-8"?>
+<p:sld xmlns:a="http://schemas.openxmlformats.org/drawingml/2006/main" xmlns:r="http://schemas.openxmlformats.org/officeDocument/2006/relationships" xmlns:mc="http://schemas.openxmlformats.org/markup-compatibility/2006" xmlns:mv="urn:schemas-microsoft-com:mac:vml" xmlns:p="http://schemas.openxmlformats.org/presentationml/2006/main" xmlns:c="http://schemas.openxmlformats.org/drawingml/2006/chart" xmlns:dgm="http://schemas.openxmlformats.org/drawingml/2006/diagram" xmlns:o="urn:schemas-microsoft-com:office:office" xmlns:v="urn:schemas-microsoft-com:vml" xmlns:pvml="urn:schemas-microsoft-com:office:powerpoint" xmlns:com="http://schemas.openxmlformats.org/drawingml/2006/compatibility" xmlns:p14="http://schemas.microsoft.com/office/powerpoint/2010/main" xmlns:p15="http://schemas.microsoft.com/office/powerpoint/2012/main" xmlns:ahyp="http://schemas.microsoft.com/office/drawing/2018/hyperlinkcolor">
+  <p:cSld>
+    <p:spTree>
+      <p:nvGrpSpPr>
+        <p:cNvPr id="482" name="Shape 482"/>
+        <p:cNvGrpSpPr/>
+        <p:nvPr/>
+      </p:nvGrpSpPr>
+      <p:grpSpPr>
+        <a:xfrm>
+          <a:off x="0" y="0"/>
+          <a:ext cx="0" cy="0"/>
+          <a:chOff x="0" y="0"/>
+          <a:chExt cx="0" cy="0"/>
+        </a:xfrm>
+      </p:grpSpPr>
+      <p:sp>
+        <p:nvSpPr>
+          <p:cNvPr id="483" name="Google Shape;483;p55"/>
+          <p:cNvSpPr/>
+          <p:nvPr/>
+        </p:nvSpPr>
+        <p:spPr>
+          <a:xfrm>
+            <a:off x="18488" y="18913"/>
+            <a:ext cx="9107025" cy="5105675"/>
+          </a:xfrm>
+          <a:prstGeom prst="flowChartProcess">
+            <a:avLst/>
+          </a:prstGeom>
+          <a:solidFill>
+            <a:schemeClr val="lt1"/>
+          </a:solidFill>
+          <a:ln cap="flat" cmpd="sng" w="9525">
+            <a:solidFill>
+              <a:schemeClr val="dk2"/>
+            </a:solidFill>
+            <a:prstDash val="solid"/>
+            <a:round/>
+            <a:headEnd len="sm" w="sm" type="none"/>
+            <a:tailEnd len="sm" w="sm" type="none"/>
+          </a:ln>
+        </p:spPr>
+        <p:txBody>
+          <a:bodyPr anchorCtr="0" anchor="ctr" bIns="91425" lIns="91425" spcFirstLastPara="1" rIns="91425" wrap="square" tIns="91425">
+            <a:noAutofit/>
+          </a:bodyPr>
+          <a:lstStyle/>
+          <a:p>
+            <a:pPr indent="0" lvl="0" marL="0" rtl="0" algn="l">
+              <a:spcBef>
+                <a:spcPts val="0"/>
+              </a:spcBef>
+              <a:spcAft>
+                <a:spcPts val="0"/>
+              </a:spcAft>
+              <a:buNone/>
+            </a:pPr>
+            <a:r>
+              <a:t/>
+            </a:r>
+            <a:endParaRPr/>
+          </a:p>
+        </p:txBody>
+      </p:sp>
+      <p:sp>
+        <p:nvSpPr>
+          <p:cNvPr id="484" name="Google Shape;484;p55"/>
+          <p:cNvSpPr/>
+          <p:nvPr/>
+        </p:nvSpPr>
+        <p:spPr>
+          <a:xfrm>
+            <a:off x="1385400" y="1062125"/>
+            <a:ext cx="6373200" cy="4022400"/>
+          </a:xfrm>
+          <a:prstGeom prst="rect">
+            <a:avLst/>
+          </a:prstGeom>
+          <a:solidFill>
+            <a:schemeClr val="lt1"/>
+          </a:solidFill>
+          <a:ln cap="flat" cmpd="sng" w="9525">
+            <a:solidFill>
+              <a:schemeClr val="dk2"/>
+            </a:solidFill>
+            <a:prstDash val="solid"/>
+            <a:round/>
+            <a:headEnd len="sm" w="sm" type="none"/>
+            <a:tailEnd len="sm" w="sm" type="none"/>
+          </a:ln>
+        </p:spPr>
+        <p:txBody>
+          <a:bodyPr anchorCtr="0" anchor="ctr" bIns="91425" lIns="91425" spcFirstLastPara="1" rIns="91425" wrap="square" tIns="91425">
+            <a:noAutofit/>
+          </a:bodyPr>
+          <a:lstStyle/>
+          <a:p>
+            <a:pPr indent="0" lvl="0" marL="0" rtl="0" algn="l">
+              <a:spcBef>
+                <a:spcPts val="0"/>
+              </a:spcBef>
+              <a:spcAft>
+                <a:spcPts val="0"/>
+              </a:spcAft>
+              <a:buNone/>
+            </a:pPr>
+            <a:r>
+              <a:t/>
+            </a:r>
+            <a:endParaRPr/>
+          </a:p>
+        </p:txBody>
+      </p:sp>
+      <p:sp>
+        <p:nvSpPr>
+          <p:cNvPr id="485" name="Google Shape;485;p55"/>
+          <p:cNvSpPr txBox="1"/>
+          <p:nvPr>
+            <p:ph type="ctrTitle"/>
+          </p:nvPr>
+        </p:nvSpPr>
+        <p:spPr>
+          <a:xfrm>
+            <a:off x="2673600" y="568175"/>
+            <a:ext cx="3796800" cy="441000"/>
+          </a:xfrm>
+          <a:prstGeom prst="rect">
+            <a:avLst/>
+          </a:prstGeom>
+        </p:spPr>
+        <p:txBody>
+          <a:bodyPr anchorCtr="0" anchor="b" bIns="91425" lIns="91425" spcFirstLastPara="1" rIns="91425" wrap="square" tIns="91425">
+            <a:noAutofit/>
+          </a:bodyPr>
+          <a:lstStyle/>
+          <a:p>
+            <a:pPr indent="0" lvl="0" marL="0" rtl="0" algn="ctr">
+              <a:spcBef>
+                <a:spcPts val="0"/>
+              </a:spcBef>
+              <a:spcAft>
+                <a:spcPts val="0"/>
+              </a:spcAft>
+              <a:buSzPts val="990"/>
+              <a:buNone/>
+            </a:pPr>
+            <a:r>
+              <a:rPr b="1" lang="pt-BR" sz="2200"/>
+              <a:t>Fechando uma issue</a:t>
+            </a:r>
+            <a:endParaRPr b="1" sz="2200"/>
+          </a:p>
+        </p:txBody>
+      </p:sp>
+      <p:sp>
+        <p:nvSpPr>
+          <p:cNvPr id="486" name="Google Shape;486;p55"/>
+          <p:cNvSpPr txBox="1"/>
+          <p:nvPr/>
+        </p:nvSpPr>
+        <p:spPr>
+          <a:xfrm>
+            <a:off x="5936450" y="198875"/>
+            <a:ext cx="3000000" cy="369300"/>
+          </a:xfrm>
+          <a:prstGeom prst="rect">
+            <a:avLst/>
+          </a:prstGeom>
+          <a:noFill/>
+          <a:ln>
+            <a:noFill/>
+          </a:ln>
+        </p:spPr>
+        <p:txBody>
+          <a:bodyPr anchorCtr="0" anchor="t" bIns="91425" lIns="91425" spcFirstLastPara="1" rIns="91425" wrap="square" tIns="91425">
+            <a:spAutoFit/>
+          </a:bodyPr>
+          <a:lstStyle/>
+          <a:p>
+            <a:pPr indent="0" lvl="0" marL="0" rtl="0" algn="ctr">
+              <a:spcBef>
+                <a:spcPts val="0"/>
+              </a:spcBef>
+              <a:spcAft>
+                <a:spcPts val="0"/>
+              </a:spcAft>
+              <a:buNone/>
+            </a:pPr>
+            <a:r>
+              <a:rPr b="1" lang="pt-BR" sz="1200">
+                <a:solidFill>
+                  <a:schemeClr val="dk1"/>
+                </a:solidFill>
+              </a:rPr>
+              <a:t>Módulo 8: Issues</a:t>
+            </a:r>
+            <a:endParaRPr b="1" sz="1200">
+              <a:solidFill>
+                <a:schemeClr val="dk1"/>
+              </a:solidFill>
+            </a:endParaRPr>
+          </a:p>
+        </p:txBody>
+      </p:sp>
+      <p:pic>
+        <p:nvPicPr>
+          <p:cNvPr id="487" name="Google Shape;487;p55"/>
+          <p:cNvPicPr preferRelativeResize="0"/>
+          <p:nvPr/>
+        </p:nvPicPr>
+        <p:blipFill>
+          <a:blip r:embed="rId3">
+            <a:alphaModFix/>
+          </a:blip>
+          <a:stretch>
+            <a:fillRect/>
+          </a:stretch>
+        </p:blipFill>
+        <p:spPr>
+          <a:xfrm>
+            <a:off x="1430928" y="1107842"/>
+            <a:ext cx="6282019" cy="3931066"/>
+          </a:xfrm>
+          <a:prstGeom prst="rect">
+            <a:avLst/>
+          </a:prstGeom>
+          <a:noFill/>
+          <a:ln>
+            <a:noFill/>
+          </a:ln>
+        </p:spPr>
+      </p:pic>
+    </p:spTree>
+  </p:cSld>
+  <p:clrMapOvr>
+    <a:masterClrMapping/>
+  </p:clrMapOvr>
+</p:sld>
+</file>
+
+<file path=ppt/slides/slide44.xml><?xml version="1.0" encoding="utf-8"?>
+<p:sld xmlns:a="http://schemas.openxmlformats.org/drawingml/2006/main" xmlns:r="http://schemas.openxmlformats.org/officeDocument/2006/relationships" xmlns:mc="http://schemas.openxmlformats.org/markup-compatibility/2006" xmlns:mv="urn:schemas-microsoft-com:mac:vml" xmlns:p="http://schemas.openxmlformats.org/presentationml/2006/main" xmlns:c="http://schemas.openxmlformats.org/drawingml/2006/chart" xmlns:dgm="http://schemas.openxmlformats.org/drawingml/2006/diagram" xmlns:o="urn:schemas-microsoft-com:office:office" xmlns:v="urn:schemas-microsoft-com:vml" xmlns:pvml="urn:schemas-microsoft-com:office:powerpoint" xmlns:com="http://schemas.openxmlformats.org/drawingml/2006/compatibility" xmlns:p14="http://schemas.microsoft.com/office/powerpoint/2010/main" xmlns:p15="http://schemas.microsoft.com/office/powerpoint/2012/main" xmlns:ahyp="http://schemas.microsoft.com/office/drawing/2018/hyperlinkcolor">
+  <p:cSld>
+    <p:spTree>
+      <p:nvGrpSpPr>
+        <p:cNvPr id="491" name="Shape 491"/>
+        <p:cNvGrpSpPr/>
+        <p:nvPr/>
+      </p:nvGrpSpPr>
+      <p:grpSpPr>
+        <a:xfrm>
+          <a:off x="0" y="0"/>
+          <a:ext cx="0" cy="0"/>
+          <a:chOff x="0" y="0"/>
+          <a:chExt cx="0" cy="0"/>
+        </a:xfrm>
+      </p:grpSpPr>
+      <p:sp>
+        <p:nvSpPr>
+          <p:cNvPr id="492" name="Google Shape;492;p56"/>
+          <p:cNvSpPr/>
+          <p:nvPr/>
+        </p:nvSpPr>
+        <p:spPr>
+          <a:xfrm>
+            <a:off x="18488" y="18913"/>
+            <a:ext cx="9107025" cy="5105675"/>
+          </a:xfrm>
+          <a:prstGeom prst="flowChartProcess">
+            <a:avLst/>
+          </a:prstGeom>
+          <a:solidFill>
+            <a:schemeClr val="lt1"/>
+          </a:solidFill>
+          <a:ln cap="flat" cmpd="sng" w="9525">
+            <a:solidFill>
+              <a:schemeClr val="dk2"/>
+            </a:solidFill>
+            <a:prstDash val="solid"/>
+            <a:round/>
+            <a:headEnd len="sm" w="sm" type="none"/>
+            <a:tailEnd len="sm" w="sm" type="none"/>
+          </a:ln>
+        </p:spPr>
+        <p:txBody>
+          <a:bodyPr anchorCtr="0" anchor="ctr" bIns="91425" lIns="91425" spcFirstLastPara="1" rIns="91425" wrap="square" tIns="91425">
+            <a:noAutofit/>
+          </a:bodyPr>
+          <a:lstStyle/>
+          <a:p>
+            <a:pPr indent="0" lvl="0" marL="0" rtl="0" algn="l">
+              <a:spcBef>
+                <a:spcPts val="0"/>
+              </a:spcBef>
+              <a:spcAft>
+                <a:spcPts val="0"/>
+              </a:spcAft>
+              <a:buNone/>
+            </a:pPr>
+            <a:r>
+              <a:t/>
+            </a:r>
+            <a:endParaRPr/>
+          </a:p>
+        </p:txBody>
+      </p:sp>
+      <p:sp>
+        <p:nvSpPr>
+          <p:cNvPr id="493" name="Google Shape;493;p56"/>
+          <p:cNvSpPr/>
+          <p:nvPr/>
+        </p:nvSpPr>
+        <p:spPr>
+          <a:xfrm>
+            <a:off x="2040300" y="1120075"/>
+            <a:ext cx="5063400" cy="3963000"/>
+          </a:xfrm>
+          <a:prstGeom prst="rect">
+            <a:avLst/>
+          </a:prstGeom>
+          <a:solidFill>
+            <a:schemeClr val="lt1"/>
+          </a:solidFill>
+          <a:ln cap="flat" cmpd="sng" w="9525">
+            <a:solidFill>
+              <a:schemeClr val="dk2"/>
+            </a:solidFill>
+            <a:prstDash val="solid"/>
+            <a:round/>
+            <a:headEnd len="sm" w="sm" type="none"/>
+            <a:tailEnd len="sm" w="sm" type="none"/>
+          </a:ln>
+        </p:spPr>
+        <p:txBody>
+          <a:bodyPr anchorCtr="0" anchor="ctr" bIns="91425" lIns="91425" spcFirstLastPara="1" rIns="91425" wrap="square" tIns="91425">
+            <a:noAutofit/>
+          </a:bodyPr>
+          <a:lstStyle/>
+          <a:p>
+            <a:pPr indent="0" lvl="0" marL="0" rtl="0" algn="l">
+              <a:spcBef>
+                <a:spcPts val="0"/>
+              </a:spcBef>
+              <a:spcAft>
+                <a:spcPts val="0"/>
+              </a:spcAft>
+              <a:buNone/>
+            </a:pPr>
+            <a:r>
+              <a:t/>
+            </a:r>
+            <a:endParaRPr/>
+          </a:p>
+        </p:txBody>
+      </p:sp>
+      <p:sp>
+        <p:nvSpPr>
+          <p:cNvPr id="494" name="Google Shape;494;p56"/>
+          <p:cNvSpPr txBox="1"/>
+          <p:nvPr>
+            <p:ph type="ctrTitle"/>
+          </p:nvPr>
+        </p:nvSpPr>
+        <p:spPr>
+          <a:xfrm>
+            <a:off x="918900" y="568175"/>
+            <a:ext cx="7306200" cy="441000"/>
+          </a:xfrm>
+          <a:prstGeom prst="rect">
+            <a:avLst/>
+          </a:prstGeom>
+        </p:spPr>
+        <p:txBody>
+          <a:bodyPr anchorCtr="0" anchor="b" bIns="91425" lIns="91425" spcFirstLastPara="1" rIns="91425" wrap="square" tIns="91425">
+            <a:noAutofit/>
+          </a:bodyPr>
+          <a:lstStyle/>
+          <a:p>
+            <a:pPr indent="0" lvl="0" marL="0" rtl="0" algn="ctr">
+              <a:spcBef>
+                <a:spcPts val="0"/>
+              </a:spcBef>
+              <a:spcAft>
+                <a:spcPts val="0"/>
+              </a:spcAft>
+              <a:buSzPts val="990"/>
+              <a:buNone/>
+            </a:pPr>
+            <a:r>
+              <a:rPr b="1" lang="pt-BR" sz="2200"/>
+              <a:t>Exemplos de sintaxes para utilizar nos comentários</a:t>
+            </a:r>
+            <a:endParaRPr b="1" sz="2200"/>
+          </a:p>
+        </p:txBody>
+      </p:sp>
+      <p:sp>
+        <p:nvSpPr>
+          <p:cNvPr id="495" name="Google Shape;495;p56"/>
+          <p:cNvSpPr txBox="1"/>
+          <p:nvPr/>
+        </p:nvSpPr>
+        <p:spPr>
+          <a:xfrm>
+            <a:off x="5936450" y="198875"/>
+            <a:ext cx="3000000" cy="369300"/>
+          </a:xfrm>
+          <a:prstGeom prst="rect">
+            <a:avLst/>
+          </a:prstGeom>
+          <a:noFill/>
+          <a:ln>
+            <a:noFill/>
+          </a:ln>
+        </p:spPr>
+        <p:txBody>
+          <a:bodyPr anchorCtr="0" anchor="t" bIns="91425" lIns="91425" spcFirstLastPara="1" rIns="91425" wrap="square" tIns="91425">
+            <a:spAutoFit/>
+          </a:bodyPr>
+          <a:lstStyle/>
+          <a:p>
+            <a:pPr indent="0" lvl="0" marL="0" rtl="0" algn="ctr">
+              <a:spcBef>
+                <a:spcPts val="0"/>
+              </a:spcBef>
+              <a:spcAft>
+                <a:spcPts val="0"/>
+              </a:spcAft>
+              <a:buNone/>
+            </a:pPr>
+            <a:r>
+              <a:rPr b="1" lang="pt-BR" sz="1200">
+                <a:solidFill>
+                  <a:schemeClr val="dk1"/>
+                </a:solidFill>
+              </a:rPr>
+              <a:t>Módulo 8: Issues</a:t>
+            </a:r>
+            <a:endParaRPr b="1" sz="1200">
+              <a:solidFill>
+                <a:schemeClr val="dk1"/>
+              </a:solidFill>
+            </a:endParaRPr>
+          </a:p>
+        </p:txBody>
+      </p:sp>
+      <p:pic>
+        <p:nvPicPr>
+          <p:cNvPr id="496" name="Google Shape;496;p56"/>
+          <p:cNvPicPr preferRelativeResize="0"/>
+          <p:nvPr/>
+        </p:nvPicPr>
+        <p:blipFill>
+          <a:blip r:embed="rId3">
+            <a:alphaModFix/>
+          </a:blip>
+          <a:stretch>
+            <a:fillRect/>
+          </a:stretch>
+        </p:blipFill>
+        <p:spPr>
+          <a:xfrm>
             <a:off x="2066905" y="1150206"/>
             <a:ext cx="5010092" cy="3902638"/>
+          </a:xfrm>
+          <a:prstGeom prst="rect">
+            <a:avLst/>
+          </a:prstGeom>
+          <a:noFill/>
+          <a:ln>
+            <a:noFill/>
+          </a:ln>
+        </p:spPr>
+      </p:pic>
+    </p:spTree>
+  </p:cSld>
+  <p:clrMapOvr>
+    <a:masterClrMapping/>
+  </p:clrMapOvr>
+</p:sld>
+</file>
+
+<file path=ppt/slides/slide45.xml><?xml version="1.0" encoding="utf-8"?>
+<p:sld xmlns:a="http://schemas.openxmlformats.org/drawingml/2006/main" xmlns:r="http://schemas.openxmlformats.org/officeDocument/2006/relationships" xmlns:mc="http://schemas.openxmlformats.org/markup-compatibility/2006" xmlns:mv="urn:schemas-microsoft-com:mac:vml" xmlns:p="http://schemas.openxmlformats.org/presentationml/2006/main" xmlns:c="http://schemas.openxmlformats.org/drawingml/2006/chart" xmlns:dgm="http://schemas.openxmlformats.org/drawingml/2006/diagram" xmlns:o="urn:schemas-microsoft-com:office:office" xmlns:v="urn:schemas-microsoft-com:vml" xmlns:pvml="urn:schemas-microsoft-com:office:powerpoint" xmlns:com="http://schemas.openxmlformats.org/drawingml/2006/compatibility" xmlns:p14="http://schemas.microsoft.com/office/powerpoint/2010/main" xmlns:p15="http://schemas.microsoft.com/office/powerpoint/2012/main" xmlns:ahyp="http://schemas.microsoft.com/office/drawing/2018/hyperlinkcolor">
+  <p:cSld>
+    <p:spTree>
+      <p:nvGrpSpPr>
+        <p:cNvPr id="500" name="Shape 500"/>
+        <p:cNvGrpSpPr/>
+        <p:nvPr/>
+      </p:nvGrpSpPr>
+      <p:grpSpPr>
+        <a:xfrm>
+          <a:off x="0" y="0"/>
+          <a:ext cx="0" cy="0"/>
+          <a:chOff x="0" y="0"/>
+          <a:chExt cx="0" cy="0"/>
+        </a:xfrm>
+      </p:grpSpPr>
+      <p:sp>
+        <p:nvSpPr>
+          <p:cNvPr id="501" name="Google Shape;501;p57"/>
+          <p:cNvSpPr/>
+          <p:nvPr/>
+        </p:nvSpPr>
+        <p:spPr>
+          <a:xfrm>
+            <a:off x="18488" y="18913"/>
+            <a:ext cx="9107025" cy="5105675"/>
+          </a:xfrm>
+          <a:prstGeom prst="flowChartProcess">
+            <a:avLst/>
+          </a:prstGeom>
+          <a:solidFill>
+            <a:schemeClr val="lt1"/>
+          </a:solidFill>
+          <a:ln cap="flat" cmpd="sng" w="9525">
+            <a:solidFill>
+              <a:schemeClr val="dk2"/>
+            </a:solidFill>
+            <a:prstDash val="solid"/>
+            <a:round/>
+            <a:headEnd len="sm" w="sm" type="none"/>
+            <a:tailEnd len="sm" w="sm" type="none"/>
+          </a:ln>
+        </p:spPr>
+        <p:txBody>
+          <a:bodyPr anchorCtr="0" anchor="ctr" bIns="91425" lIns="91425" spcFirstLastPara="1" rIns="91425" wrap="square" tIns="91425">
+            <a:noAutofit/>
+          </a:bodyPr>
+          <a:lstStyle/>
+          <a:p>
+            <a:pPr indent="0" lvl="0" marL="0" rtl="0" algn="l">
+              <a:spcBef>
+                <a:spcPts val="0"/>
+              </a:spcBef>
+              <a:spcAft>
+                <a:spcPts val="0"/>
+              </a:spcAft>
+              <a:buNone/>
+            </a:pPr>
+            <a:r>
+              <a:t/>
+            </a:r>
+            <a:endParaRPr/>
+          </a:p>
+        </p:txBody>
+      </p:sp>
+      <p:sp>
+        <p:nvSpPr>
+          <p:cNvPr id="502" name="Google Shape;502;p57"/>
+          <p:cNvSpPr/>
+          <p:nvPr/>
+        </p:nvSpPr>
+        <p:spPr>
+          <a:xfrm>
+            <a:off x="5347400" y="1629812"/>
+            <a:ext cx="3386400" cy="2727000"/>
+          </a:xfrm>
+          <a:prstGeom prst="rect">
+            <a:avLst/>
+          </a:prstGeom>
+          <a:solidFill>
+            <a:schemeClr val="lt1"/>
+          </a:solidFill>
+          <a:ln cap="flat" cmpd="sng" w="9525">
+            <a:solidFill>
+              <a:schemeClr val="dk2"/>
+            </a:solidFill>
+            <a:prstDash val="solid"/>
+            <a:round/>
+            <a:headEnd len="sm" w="sm" type="none"/>
+            <a:tailEnd len="sm" w="sm" type="none"/>
+          </a:ln>
+        </p:spPr>
+        <p:txBody>
+          <a:bodyPr anchorCtr="0" anchor="ctr" bIns="91425" lIns="91425" spcFirstLastPara="1" rIns="91425" wrap="square" tIns="91425">
+            <a:noAutofit/>
+          </a:bodyPr>
+          <a:lstStyle/>
+          <a:p>
+            <a:pPr indent="0" lvl="0" marL="0" rtl="0" algn="l">
+              <a:spcBef>
+                <a:spcPts val="0"/>
+              </a:spcBef>
+              <a:spcAft>
+                <a:spcPts val="0"/>
+              </a:spcAft>
+              <a:buNone/>
+            </a:pPr>
+            <a:r>
+              <a:t/>
+            </a:r>
+            <a:endParaRPr/>
+          </a:p>
+        </p:txBody>
+      </p:sp>
+      <p:sp>
+        <p:nvSpPr>
+          <p:cNvPr id="503" name="Google Shape;503;p57"/>
+          <p:cNvSpPr/>
+          <p:nvPr/>
+        </p:nvSpPr>
+        <p:spPr>
+          <a:xfrm>
+            <a:off x="413700" y="1341500"/>
+            <a:ext cx="4520400" cy="3303600"/>
+          </a:xfrm>
+          <a:prstGeom prst="rect">
+            <a:avLst/>
+          </a:prstGeom>
+          <a:solidFill>
+            <a:schemeClr val="lt1"/>
+          </a:solidFill>
+          <a:ln cap="flat" cmpd="sng" w="9525">
+            <a:solidFill>
+              <a:schemeClr val="dk2"/>
+            </a:solidFill>
+            <a:prstDash val="solid"/>
+            <a:round/>
+            <a:headEnd len="sm" w="sm" type="none"/>
+            <a:tailEnd len="sm" w="sm" type="none"/>
+          </a:ln>
+        </p:spPr>
+        <p:txBody>
+          <a:bodyPr anchorCtr="0" anchor="ctr" bIns="91425" lIns="91425" spcFirstLastPara="1" rIns="91425" wrap="square" tIns="91425">
+            <a:noAutofit/>
+          </a:bodyPr>
+          <a:lstStyle/>
+          <a:p>
+            <a:pPr indent="0" lvl="0" marL="0" rtl="0" algn="l">
+              <a:spcBef>
+                <a:spcPts val="0"/>
+              </a:spcBef>
+              <a:spcAft>
+                <a:spcPts val="0"/>
+              </a:spcAft>
+              <a:buNone/>
+            </a:pPr>
+            <a:r>
+              <a:t/>
+            </a:r>
+            <a:endParaRPr/>
+          </a:p>
+        </p:txBody>
+      </p:sp>
+      <p:sp>
+        <p:nvSpPr>
+          <p:cNvPr id="504" name="Google Shape;504;p57"/>
+          <p:cNvSpPr txBox="1"/>
+          <p:nvPr>
+            <p:ph type="ctrTitle"/>
+          </p:nvPr>
+        </p:nvSpPr>
+        <p:spPr>
+          <a:xfrm>
+            <a:off x="918900" y="568175"/>
+            <a:ext cx="7306200" cy="441000"/>
+          </a:xfrm>
+          <a:prstGeom prst="rect">
+            <a:avLst/>
+          </a:prstGeom>
+        </p:spPr>
+        <p:txBody>
+          <a:bodyPr anchorCtr="0" anchor="b" bIns="91425" lIns="91425" spcFirstLastPara="1" rIns="91425" wrap="square" tIns="91425">
+            <a:noAutofit/>
+          </a:bodyPr>
+          <a:lstStyle/>
+          <a:p>
+            <a:pPr indent="0" lvl="0" marL="0" rtl="0" algn="ctr">
+              <a:spcBef>
+                <a:spcPts val="0"/>
+              </a:spcBef>
+              <a:spcAft>
+                <a:spcPts val="0"/>
+              </a:spcAft>
+              <a:buSzPts val="990"/>
+              <a:buNone/>
+            </a:pPr>
+            <a:r>
+              <a:rPr b="1" lang="pt-BR" sz="2200"/>
+              <a:t>O que é o .gitignore?</a:t>
+            </a:r>
+            <a:endParaRPr b="1" sz="2200"/>
+          </a:p>
+        </p:txBody>
+      </p:sp>
+      <p:sp>
+        <p:nvSpPr>
+          <p:cNvPr id="505" name="Google Shape;505;p57"/>
+          <p:cNvSpPr txBox="1"/>
+          <p:nvPr/>
+        </p:nvSpPr>
+        <p:spPr>
+          <a:xfrm>
+            <a:off x="5936450" y="198875"/>
+            <a:ext cx="3000000" cy="369300"/>
+          </a:xfrm>
+          <a:prstGeom prst="rect">
+            <a:avLst/>
+          </a:prstGeom>
+          <a:noFill/>
+          <a:ln>
+            <a:noFill/>
+          </a:ln>
+        </p:spPr>
+        <p:txBody>
+          <a:bodyPr anchorCtr="0" anchor="t" bIns="91425" lIns="91425" spcFirstLastPara="1" rIns="91425" wrap="square" tIns="91425">
+            <a:spAutoFit/>
+          </a:bodyPr>
+          <a:lstStyle/>
+          <a:p>
+            <a:pPr indent="0" lvl="0" marL="0" rtl="0" algn="ctr">
+              <a:spcBef>
+                <a:spcPts val="0"/>
+              </a:spcBef>
+              <a:spcAft>
+                <a:spcPts val="0"/>
+              </a:spcAft>
+              <a:buNone/>
+            </a:pPr>
+            <a:r>
+              <a:rPr b="1" lang="pt-BR" sz="1200">
+                <a:solidFill>
+                  <a:schemeClr val="dk1"/>
+                </a:solidFill>
+              </a:rPr>
+              <a:t>Módulo 9: gitignore</a:t>
+            </a:r>
+            <a:endParaRPr b="1" sz="1200">
+              <a:solidFill>
+                <a:schemeClr val="dk1"/>
+              </a:solidFill>
+            </a:endParaRPr>
+          </a:p>
+        </p:txBody>
+      </p:sp>
+      <p:pic>
+        <p:nvPicPr>
+          <p:cNvPr id="506" name="Google Shape;506;p57"/>
+          <p:cNvPicPr preferRelativeResize="0"/>
+          <p:nvPr/>
+        </p:nvPicPr>
+        <p:blipFill>
+          <a:blip r:embed="rId3">
+            <a:alphaModFix/>
+          </a:blip>
+          <a:stretch>
+            <a:fillRect/>
+          </a:stretch>
+        </p:blipFill>
+        <p:spPr>
+          <a:xfrm>
+            <a:off x="434824" y="1351984"/>
+            <a:ext cx="4477613" cy="3282481"/>
+          </a:xfrm>
+          <a:prstGeom prst="rect">
+            <a:avLst/>
+          </a:prstGeom>
+          <a:noFill/>
+          <a:ln>
+            <a:noFill/>
+          </a:ln>
+        </p:spPr>
+      </p:pic>
+      <p:pic>
+        <p:nvPicPr>
+          <p:cNvPr id="507" name="Google Shape;507;p57"/>
+          <p:cNvPicPr preferRelativeResize="0"/>
+          <p:nvPr/>
+        </p:nvPicPr>
+        <p:blipFill>
+          <a:blip r:embed="rId4">
+            <a:alphaModFix/>
+          </a:blip>
+          <a:stretch>
+            <a:fillRect/>
+          </a:stretch>
+        </p:blipFill>
+        <p:spPr>
+          <a:xfrm>
+            <a:off x="5366889" y="1629800"/>
+            <a:ext cx="3347425" cy="2710600"/>
+          </a:xfrm>
+          <a:prstGeom prst="rect">
+            <a:avLst/>
+          </a:prstGeom>
+          <a:noFill/>
+          <a:ln>
+            <a:noFill/>
+          </a:ln>
+        </p:spPr>
+      </p:pic>
+    </p:spTree>
+  </p:cSld>
+  <p:clrMapOvr>
+    <a:masterClrMapping/>
+  </p:clrMapOvr>
+</p:sld>
+</file>
+
+<file path=ppt/slides/slide46.xml><?xml version="1.0" encoding="utf-8"?>
+<p:sld xmlns:a="http://schemas.openxmlformats.org/drawingml/2006/main" xmlns:r="http://schemas.openxmlformats.org/officeDocument/2006/relationships" xmlns:mc="http://schemas.openxmlformats.org/markup-compatibility/2006" xmlns:mv="urn:schemas-microsoft-com:mac:vml" xmlns:p="http://schemas.openxmlformats.org/presentationml/2006/main" xmlns:c="http://schemas.openxmlformats.org/drawingml/2006/chart" xmlns:dgm="http://schemas.openxmlformats.org/drawingml/2006/diagram" xmlns:o="urn:schemas-microsoft-com:office:office" xmlns:v="urn:schemas-microsoft-com:vml" xmlns:pvml="urn:schemas-microsoft-com:office:powerpoint" xmlns:com="http://schemas.openxmlformats.org/drawingml/2006/compatibility" xmlns:p14="http://schemas.microsoft.com/office/powerpoint/2010/main" xmlns:p15="http://schemas.microsoft.com/office/powerpoint/2012/main" xmlns:ahyp="http://schemas.microsoft.com/office/drawing/2018/hyperlinkcolor">
+  <p:cSld>
+    <p:spTree>
+      <p:nvGrpSpPr>
+        <p:cNvPr id="511" name="Shape 511"/>
+        <p:cNvGrpSpPr/>
+        <p:nvPr/>
+      </p:nvGrpSpPr>
+      <p:grpSpPr>
+        <a:xfrm>
+          <a:off x="0" y="0"/>
+          <a:ext cx="0" cy="0"/>
+          <a:chOff x="0" y="0"/>
+          <a:chExt cx="0" cy="0"/>
+        </a:xfrm>
+      </p:grpSpPr>
+      <p:sp>
+        <p:nvSpPr>
+          <p:cNvPr id="512" name="Google Shape;512;p58"/>
+          <p:cNvSpPr/>
+          <p:nvPr/>
+        </p:nvSpPr>
+        <p:spPr>
+          <a:xfrm>
+            <a:off x="18488" y="18913"/>
+            <a:ext cx="9107025" cy="5105675"/>
+          </a:xfrm>
+          <a:prstGeom prst="flowChartProcess">
+            <a:avLst/>
+          </a:prstGeom>
+          <a:solidFill>
+            <a:schemeClr val="lt1"/>
+          </a:solidFill>
+          <a:ln cap="flat" cmpd="sng" w="9525">
+            <a:solidFill>
+              <a:schemeClr val="dk2"/>
+            </a:solidFill>
+            <a:prstDash val="solid"/>
+            <a:round/>
+            <a:headEnd len="sm" w="sm" type="none"/>
+            <a:tailEnd len="sm" w="sm" type="none"/>
+          </a:ln>
+        </p:spPr>
+        <p:txBody>
+          <a:bodyPr anchorCtr="0" anchor="ctr" bIns="91425" lIns="91425" spcFirstLastPara="1" rIns="91425" wrap="square" tIns="91425">
+            <a:noAutofit/>
+          </a:bodyPr>
+          <a:lstStyle/>
+          <a:p>
+            <a:pPr indent="0" lvl="0" marL="0" rtl="0" algn="l">
+              <a:spcBef>
+                <a:spcPts val="0"/>
+              </a:spcBef>
+              <a:spcAft>
+                <a:spcPts val="0"/>
+              </a:spcAft>
+              <a:buNone/>
+            </a:pPr>
+            <a:r>
+              <a:t/>
+            </a:r>
+            <a:endParaRPr/>
+          </a:p>
+        </p:txBody>
+      </p:sp>
+      <p:sp>
+        <p:nvSpPr>
+          <p:cNvPr id="513" name="Google Shape;513;p58"/>
+          <p:cNvSpPr/>
+          <p:nvPr/>
+        </p:nvSpPr>
+        <p:spPr>
+          <a:xfrm>
+            <a:off x="4113525" y="1379325"/>
+            <a:ext cx="4854600" cy="3376200"/>
+          </a:xfrm>
+          <a:prstGeom prst="rect">
+            <a:avLst/>
+          </a:prstGeom>
+          <a:solidFill>
+            <a:schemeClr val="lt1"/>
+          </a:solidFill>
+          <a:ln cap="flat" cmpd="sng" w="9525">
+            <a:solidFill>
+              <a:schemeClr val="dk2"/>
+            </a:solidFill>
+            <a:prstDash val="solid"/>
+            <a:round/>
+            <a:headEnd len="sm" w="sm" type="none"/>
+            <a:tailEnd len="sm" w="sm" type="none"/>
+          </a:ln>
+        </p:spPr>
+        <p:txBody>
+          <a:bodyPr anchorCtr="0" anchor="ctr" bIns="91425" lIns="91425" spcFirstLastPara="1" rIns="91425" wrap="square" tIns="91425">
+            <a:noAutofit/>
+          </a:bodyPr>
+          <a:lstStyle/>
+          <a:p>
+            <a:pPr indent="0" lvl="0" marL="0" rtl="0" algn="l">
+              <a:spcBef>
+                <a:spcPts val="0"/>
+              </a:spcBef>
+              <a:spcAft>
+                <a:spcPts val="0"/>
+              </a:spcAft>
+              <a:buNone/>
+            </a:pPr>
+            <a:r>
+              <a:t/>
+            </a:r>
+            <a:endParaRPr/>
+          </a:p>
+        </p:txBody>
+      </p:sp>
+      <p:sp>
+        <p:nvSpPr>
+          <p:cNvPr id="514" name="Google Shape;514;p58"/>
+          <p:cNvSpPr/>
+          <p:nvPr/>
+        </p:nvSpPr>
+        <p:spPr>
+          <a:xfrm>
+            <a:off x="172063" y="1316525"/>
+            <a:ext cx="3814200" cy="3467400"/>
+          </a:xfrm>
+          <a:prstGeom prst="rect">
+            <a:avLst/>
+          </a:prstGeom>
+          <a:solidFill>
+            <a:schemeClr val="lt1"/>
+          </a:solidFill>
+          <a:ln cap="flat" cmpd="sng" w="9525">
+            <a:solidFill>
+              <a:schemeClr val="dk2"/>
+            </a:solidFill>
+            <a:prstDash val="solid"/>
+            <a:round/>
+            <a:headEnd len="sm" w="sm" type="none"/>
+            <a:tailEnd len="sm" w="sm" type="none"/>
+          </a:ln>
+        </p:spPr>
+        <p:txBody>
+          <a:bodyPr anchorCtr="0" anchor="ctr" bIns="91425" lIns="91425" spcFirstLastPara="1" rIns="91425" wrap="square" tIns="91425">
+            <a:noAutofit/>
+          </a:bodyPr>
+          <a:lstStyle/>
+          <a:p>
+            <a:pPr indent="0" lvl="0" marL="0" rtl="0" algn="l">
+              <a:spcBef>
+                <a:spcPts val="0"/>
+              </a:spcBef>
+              <a:spcAft>
+                <a:spcPts val="0"/>
+              </a:spcAft>
+              <a:buNone/>
+            </a:pPr>
+            <a:r>
+              <a:t/>
+            </a:r>
+            <a:endParaRPr/>
+          </a:p>
+        </p:txBody>
+      </p:sp>
+      <p:sp>
+        <p:nvSpPr>
+          <p:cNvPr id="515" name="Google Shape;515;p58"/>
+          <p:cNvSpPr txBox="1"/>
+          <p:nvPr>
+            <p:ph type="ctrTitle"/>
+          </p:nvPr>
+        </p:nvSpPr>
+        <p:spPr>
+          <a:xfrm>
+            <a:off x="918900" y="568175"/>
+            <a:ext cx="7306200" cy="441000"/>
+          </a:xfrm>
+          <a:prstGeom prst="rect">
+            <a:avLst/>
+          </a:prstGeom>
+        </p:spPr>
+        <p:txBody>
+          <a:bodyPr anchorCtr="0" anchor="b" bIns="91425" lIns="91425" spcFirstLastPara="1" rIns="91425" wrap="square" tIns="91425">
+            <a:noAutofit/>
+          </a:bodyPr>
+          <a:lstStyle/>
+          <a:p>
+            <a:pPr indent="0" lvl="0" marL="0" rtl="0" algn="ctr">
+              <a:spcBef>
+                <a:spcPts val="0"/>
+              </a:spcBef>
+              <a:spcAft>
+                <a:spcPts val="0"/>
+              </a:spcAft>
+              <a:buSzPts val="990"/>
+              <a:buNone/>
+            </a:pPr>
+            <a:r>
+              <a:rPr b="1" lang="pt-BR" sz="2200"/>
+              <a:t>Ignorando arquivos</a:t>
+            </a:r>
+            <a:endParaRPr b="1" sz="2200"/>
+          </a:p>
+        </p:txBody>
+      </p:sp>
+      <p:sp>
+        <p:nvSpPr>
+          <p:cNvPr id="516" name="Google Shape;516;p58"/>
+          <p:cNvSpPr txBox="1"/>
+          <p:nvPr/>
+        </p:nvSpPr>
+        <p:spPr>
+          <a:xfrm>
+            <a:off x="5936450" y="198875"/>
+            <a:ext cx="3000000" cy="369300"/>
+          </a:xfrm>
+          <a:prstGeom prst="rect">
+            <a:avLst/>
+          </a:prstGeom>
+          <a:noFill/>
+          <a:ln>
+            <a:noFill/>
+          </a:ln>
+        </p:spPr>
+        <p:txBody>
+          <a:bodyPr anchorCtr="0" anchor="t" bIns="91425" lIns="91425" spcFirstLastPara="1" rIns="91425" wrap="square" tIns="91425">
+            <a:spAutoFit/>
+          </a:bodyPr>
+          <a:lstStyle/>
+          <a:p>
+            <a:pPr indent="0" lvl="0" marL="0" rtl="0" algn="ctr">
+              <a:spcBef>
+                <a:spcPts val="0"/>
+              </a:spcBef>
+              <a:spcAft>
+                <a:spcPts val="0"/>
+              </a:spcAft>
+              <a:buNone/>
+            </a:pPr>
+            <a:r>
+              <a:rPr b="1" lang="pt-BR" sz="1200">
+                <a:solidFill>
+                  <a:schemeClr val="dk1"/>
+                </a:solidFill>
+              </a:rPr>
+              <a:t>Módulo 9: gitignore</a:t>
+            </a:r>
+            <a:endParaRPr b="1" sz="1200">
+              <a:solidFill>
+                <a:schemeClr val="dk1"/>
+              </a:solidFill>
+            </a:endParaRPr>
+          </a:p>
+        </p:txBody>
+      </p:sp>
+      <p:pic>
+        <p:nvPicPr>
+          <p:cNvPr id="517" name="Google Shape;517;p58"/>
+          <p:cNvPicPr preferRelativeResize="0"/>
+          <p:nvPr/>
+        </p:nvPicPr>
+        <p:blipFill>
+          <a:blip r:embed="rId3">
+            <a:alphaModFix/>
+          </a:blip>
+          <a:stretch>
+            <a:fillRect/>
+          </a:stretch>
+        </p:blipFill>
+        <p:spPr>
+          <a:xfrm>
+            <a:off x="185100" y="1339163"/>
+            <a:ext cx="3788125" cy="3422125"/>
+          </a:xfrm>
+          <a:prstGeom prst="rect">
+            <a:avLst/>
+          </a:prstGeom>
+          <a:noFill/>
+          <a:ln>
+            <a:noFill/>
+          </a:ln>
+        </p:spPr>
+      </p:pic>
+      <p:pic>
+        <p:nvPicPr>
+          <p:cNvPr id="518" name="Google Shape;518;p58"/>
+          <p:cNvPicPr preferRelativeResize="0"/>
+          <p:nvPr/>
+        </p:nvPicPr>
+        <p:blipFill>
+          <a:blip r:embed="rId4">
+            <a:alphaModFix/>
+          </a:blip>
+          <a:stretch>
+            <a:fillRect/>
+          </a:stretch>
+        </p:blipFill>
+        <p:spPr>
+          <a:xfrm>
+            <a:off x="4145200" y="1379337"/>
+            <a:ext cx="4791249" cy="3341800"/>
+          </a:xfrm>
+          <a:prstGeom prst="rect">
+            <a:avLst/>
+          </a:prstGeom>
+          <a:noFill/>
+          <a:ln>
+            <a:noFill/>
+          </a:ln>
+        </p:spPr>
+      </p:pic>
+    </p:spTree>
+  </p:cSld>
+  <p:clrMapOvr>
+    <a:masterClrMapping/>
+  </p:clrMapOvr>
+</p:sld>
+</file>
+
+<file path=ppt/slides/slide47.xml><?xml version="1.0" encoding="utf-8"?>
+<p:sld xmlns:a="http://schemas.openxmlformats.org/drawingml/2006/main" xmlns:r="http://schemas.openxmlformats.org/officeDocument/2006/relationships" xmlns:mc="http://schemas.openxmlformats.org/markup-compatibility/2006" xmlns:mv="urn:schemas-microsoft-com:mac:vml" xmlns:p="http://schemas.openxmlformats.org/presentationml/2006/main" xmlns:c="http://schemas.openxmlformats.org/drawingml/2006/chart" xmlns:dgm="http://schemas.openxmlformats.org/drawingml/2006/diagram" xmlns:o="urn:schemas-microsoft-com:office:office" xmlns:v="urn:schemas-microsoft-com:vml" xmlns:pvml="urn:schemas-microsoft-com:office:powerpoint" xmlns:com="http://schemas.openxmlformats.org/drawingml/2006/compatibility" xmlns:p14="http://schemas.microsoft.com/office/powerpoint/2010/main" xmlns:p15="http://schemas.microsoft.com/office/powerpoint/2012/main" xmlns:ahyp="http://schemas.microsoft.com/office/drawing/2018/hyperlinkcolor">
+  <p:cSld>
+    <p:spTree>
+      <p:nvGrpSpPr>
+        <p:cNvPr id="522" name="Shape 522"/>
+        <p:cNvGrpSpPr/>
+        <p:nvPr/>
+      </p:nvGrpSpPr>
+      <p:grpSpPr>
+        <a:xfrm>
+          <a:off x="0" y="0"/>
+          <a:ext cx="0" cy="0"/>
+          <a:chOff x="0" y="0"/>
+          <a:chExt cx="0" cy="0"/>
+        </a:xfrm>
+      </p:grpSpPr>
+      <p:sp>
+        <p:nvSpPr>
+          <p:cNvPr id="523" name="Google Shape;523;p59"/>
+          <p:cNvSpPr/>
+          <p:nvPr/>
+        </p:nvSpPr>
+        <p:spPr>
+          <a:xfrm>
+            <a:off x="18488" y="18913"/>
+            <a:ext cx="9107025" cy="5105675"/>
+          </a:xfrm>
+          <a:prstGeom prst="flowChartProcess">
+            <a:avLst/>
+          </a:prstGeom>
+          <a:solidFill>
+            <a:schemeClr val="lt1"/>
+          </a:solidFill>
+          <a:ln cap="flat" cmpd="sng" w="9525">
+            <a:solidFill>
+              <a:schemeClr val="dk2"/>
+            </a:solidFill>
+            <a:prstDash val="solid"/>
+            <a:round/>
+            <a:headEnd len="sm" w="sm" type="none"/>
+            <a:tailEnd len="sm" w="sm" type="none"/>
+          </a:ln>
+        </p:spPr>
+        <p:txBody>
+          <a:bodyPr anchorCtr="0" anchor="ctr" bIns="91425" lIns="91425" spcFirstLastPara="1" rIns="91425" wrap="square" tIns="91425">
+            <a:noAutofit/>
+          </a:bodyPr>
+          <a:lstStyle/>
+          <a:p>
+            <a:pPr indent="0" lvl="0" marL="0" rtl="0" algn="l">
+              <a:spcBef>
+                <a:spcPts val="0"/>
+              </a:spcBef>
+              <a:spcAft>
+                <a:spcPts val="0"/>
+              </a:spcAft>
+              <a:buNone/>
+            </a:pPr>
+            <a:r>
+              <a:t/>
+            </a:r>
+            <a:endParaRPr/>
+          </a:p>
+        </p:txBody>
+      </p:sp>
+      <p:sp>
+        <p:nvSpPr>
+          <p:cNvPr id="524" name="Google Shape;524;p59"/>
+          <p:cNvSpPr/>
+          <p:nvPr/>
+        </p:nvSpPr>
+        <p:spPr>
+          <a:xfrm>
+            <a:off x="3050550" y="1087325"/>
+            <a:ext cx="3042900" cy="3926100"/>
+          </a:xfrm>
+          <a:prstGeom prst="rect">
+            <a:avLst/>
+          </a:prstGeom>
+          <a:solidFill>
+            <a:schemeClr val="lt1"/>
+          </a:solidFill>
+          <a:ln cap="flat" cmpd="sng" w="9525">
+            <a:solidFill>
+              <a:schemeClr val="dk2"/>
+            </a:solidFill>
+            <a:prstDash val="solid"/>
+            <a:round/>
+            <a:headEnd len="sm" w="sm" type="none"/>
+            <a:tailEnd len="sm" w="sm" type="none"/>
+          </a:ln>
+        </p:spPr>
+        <p:txBody>
+          <a:bodyPr anchorCtr="0" anchor="ctr" bIns="91425" lIns="91425" spcFirstLastPara="1" rIns="91425" wrap="square" tIns="91425">
+            <a:noAutofit/>
+          </a:bodyPr>
+          <a:lstStyle/>
+          <a:p>
+            <a:pPr indent="0" lvl="0" marL="0" rtl="0" algn="l">
+              <a:spcBef>
+                <a:spcPts val="0"/>
+              </a:spcBef>
+              <a:spcAft>
+                <a:spcPts val="0"/>
+              </a:spcAft>
+              <a:buNone/>
+            </a:pPr>
+            <a:r>
+              <a:t/>
+            </a:r>
+            <a:endParaRPr/>
+          </a:p>
+        </p:txBody>
+      </p:sp>
+      <p:sp>
+        <p:nvSpPr>
+          <p:cNvPr id="525" name="Google Shape;525;p59"/>
+          <p:cNvSpPr txBox="1"/>
+          <p:nvPr>
+            <p:ph type="ctrTitle"/>
+          </p:nvPr>
+        </p:nvSpPr>
+        <p:spPr>
+          <a:xfrm>
+            <a:off x="918900" y="568175"/>
+            <a:ext cx="7306200" cy="441000"/>
+          </a:xfrm>
+          <a:prstGeom prst="rect">
+            <a:avLst/>
+          </a:prstGeom>
+        </p:spPr>
+        <p:txBody>
+          <a:bodyPr anchorCtr="0" anchor="b" bIns="91425" lIns="91425" spcFirstLastPara="1" rIns="91425" wrap="square" tIns="91425">
+            <a:noAutofit/>
+          </a:bodyPr>
+          <a:lstStyle/>
+          <a:p>
+            <a:pPr indent="0" lvl="0" marL="0" rtl="0" algn="ctr">
+              <a:spcBef>
+                <a:spcPts val="0"/>
+              </a:spcBef>
+              <a:spcAft>
+                <a:spcPts val="0"/>
+              </a:spcAft>
+              <a:buSzPts val="990"/>
+              <a:buNone/>
+            </a:pPr>
+            <a:r>
+              <a:rPr b="1" lang="pt-BR" sz="2200"/>
+              <a:t>Copiando o “Relative Path” de um arquivo</a:t>
+            </a:r>
+            <a:endParaRPr b="1" sz="2200"/>
+          </a:p>
+        </p:txBody>
+      </p:sp>
+      <p:sp>
+        <p:nvSpPr>
+          <p:cNvPr id="526" name="Google Shape;526;p59"/>
+          <p:cNvSpPr txBox="1"/>
+          <p:nvPr/>
+        </p:nvSpPr>
+        <p:spPr>
+          <a:xfrm>
+            <a:off x="5936450" y="198875"/>
+            <a:ext cx="3000000" cy="369300"/>
+          </a:xfrm>
+          <a:prstGeom prst="rect">
+            <a:avLst/>
+          </a:prstGeom>
+          <a:noFill/>
+          <a:ln>
+            <a:noFill/>
+          </a:ln>
+        </p:spPr>
+        <p:txBody>
+          <a:bodyPr anchorCtr="0" anchor="t" bIns="91425" lIns="91425" spcFirstLastPara="1" rIns="91425" wrap="square" tIns="91425">
+            <a:spAutoFit/>
+          </a:bodyPr>
+          <a:lstStyle/>
+          <a:p>
+            <a:pPr indent="0" lvl="0" marL="0" rtl="0" algn="ctr">
+              <a:spcBef>
+                <a:spcPts val="0"/>
+              </a:spcBef>
+              <a:spcAft>
+                <a:spcPts val="0"/>
+              </a:spcAft>
+              <a:buNone/>
+            </a:pPr>
+            <a:r>
+              <a:rPr b="1" lang="pt-BR" sz="1200">
+                <a:solidFill>
+                  <a:schemeClr val="dk1"/>
+                </a:solidFill>
+              </a:rPr>
+              <a:t>Módulo 9: gitignore</a:t>
+            </a:r>
+            <a:endParaRPr b="1" sz="1200">
+              <a:solidFill>
+                <a:schemeClr val="dk1"/>
+              </a:solidFill>
+            </a:endParaRPr>
+          </a:p>
+        </p:txBody>
+      </p:sp>
+      <p:pic>
+        <p:nvPicPr>
+          <p:cNvPr id="527" name="Google Shape;527;p59"/>
+          <p:cNvPicPr preferRelativeResize="0"/>
+          <p:nvPr/>
+        </p:nvPicPr>
+        <p:blipFill>
+          <a:blip r:embed="rId3">
+            <a:alphaModFix/>
+          </a:blip>
+          <a:stretch>
+            <a:fillRect/>
+          </a:stretch>
+        </p:blipFill>
+        <p:spPr>
+          <a:xfrm>
+            <a:off x="3069088" y="1103713"/>
+            <a:ext cx="3005950" cy="3893374"/>
+          </a:xfrm>
+          <a:prstGeom prst="rect">
+            <a:avLst/>
+          </a:prstGeom>
+          <a:noFill/>
+          <a:ln>
+            <a:noFill/>
+          </a:ln>
+        </p:spPr>
+      </p:pic>
+    </p:spTree>
+  </p:cSld>
+  <p:clrMapOvr>
+    <a:masterClrMapping/>
+  </p:clrMapOvr>
+</p:sld>
+</file>
+
+<file path=ppt/slides/slide48.xml><?xml version="1.0" encoding="utf-8"?>
+<p:sld xmlns:a="http://schemas.openxmlformats.org/drawingml/2006/main" xmlns:r="http://schemas.openxmlformats.org/officeDocument/2006/relationships" xmlns:mc="http://schemas.openxmlformats.org/markup-compatibility/2006" xmlns:mv="urn:schemas-microsoft-com:mac:vml" xmlns:p="http://schemas.openxmlformats.org/presentationml/2006/main" xmlns:c="http://schemas.openxmlformats.org/drawingml/2006/chart" xmlns:dgm="http://schemas.openxmlformats.org/drawingml/2006/diagram" xmlns:o="urn:schemas-microsoft-com:office:office" xmlns:v="urn:schemas-microsoft-com:vml" xmlns:pvml="urn:schemas-microsoft-com:office:powerpoint" xmlns:com="http://schemas.openxmlformats.org/drawingml/2006/compatibility" xmlns:p14="http://schemas.microsoft.com/office/powerpoint/2010/main" xmlns:p15="http://schemas.microsoft.com/office/powerpoint/2012/main" xmlns:ahyp="http://schemas.microsoft.com/office/drawing/2018/hyperlinkcolor">
+  <p:cSld>
+    <p:spTree>
+      <p:nvGrpSpPr>
+        <p:cNvPr id="531" name="Shape 531"/>
+        <p:cNvGrpSpPr/>
+        <p:nvPr/>
+      </p:nvGrpSpPr>
+      <p:grpSpPr>
+        <a:xfrm>
+          <a:off x="0" y="0"/>
+          <a:ext cx="0" cy="0"/>
+          <a:chOff x="0" y="0"/>
+          <a:chExt cx="0" cy="0"/>
+        </a:xfrm>
+      </p:grpSpPr>
+      <p:sp>
+        <p:nvSpPr>
+          <p:cNvPr id="532" name="Google Shape;532;p60"/>
+          <p:cNvSpPr/>
+          <p:nvPr/>
+        </p:nvSpPr>
+        <p:spPr>
+          <a:xfrm>
+            <a:off x="18488" y="18913"/>
+            <a:ext cx="9107025" cy="5105675"/>
+          </a:xfrm>
+          <a:prstGeom prst="flowChartProcess">
+            <a:avLst/>
+          </a:prstGeom>
+          <a:solidFill>
+            <a:schemeClr val="lt1"/>
+          </a:solidFill>
+          <a:ln cap="flat" cmpd="sng" w="9525">
+            <a:solidFill>
+              <a:schemeClr val="dk2"/>
+            </a:solidFill>
+            <a:prstDash val="solid"/>
+            <a:round/>
+            <a:headEnd len="sm" w="sm" type="none"/>
+            <a:tailEnd len="sm" w="sm" type="none"/>
+          </a:ln>
+        </p:spPr>
+        <p:txBody>
+          <a:bodyPr anchorCtr="0" anchor="ctr" bIns="91425" lIns="91425" spcFirstLastPara="1" rIns="91425" wrap="square" tIns="91425">
+            <a:noAutofit/>
+          </a:bodyPr>
+          <a:lstStyle/>
+          <a:p>
+            <a:pPr indent="0" lvl="0" marL="0" rtl="0" algn="l">
+              <a:spcBef>
+                <a:spcPts val="0"/>
+              </a:spcBef>
+              <a:spcAft>
+                <a:spcPts val="0"/>
+              </a:spcAft>
+              <a:buNone/>
+            </a:pPr>
+            <a:r>
+              <a:t/>
+            </a:r>
+            <a:endParaRPr/>
+          </a:p>
+        </p:txBody>
+      </p:sp>
+      <p:sp>
+        <p:nvSpPr>
+          <p:cNvPr id="533" name="Google Shape;533;p60"/>
+          <p:cNvSpPr/>
+          <p:nvPr/>
+        </p:nvSpPr>
+        <p:spPr>
+          <a:xfrm>
+            <a:off x="4103450" y="2126525"/>
+            <a:ext cx="4833000" cy="2049600"/>
+          </a:xfrm>
+          <a:prstGeom prst="rect">
+            <a:avLst/>
+          </a:prstGeom>
+          <a:solidFill>
+            <a:schemeClr val="lt1"/>
+          </a:solidFill>
+          <a:ln cap="flat" cmpd="sng" w="9525">
+            <a:solidFill>
+              <a:schemeClr val="dk2"/>
+            </a:solidFill>
+            <a:prstDash val="solid"/>
+            <a:round/>
+            <a:headEnd len="sm" w="sm" type="none"/>
+            <a:tailEnd len="sm" w="sm" type="none"/>
+          </a:ln>
+        </p:spPr>
+        <p:txBody>
+          <a:bodyPr anchorCtr="0" anchor="ctr" bIns="91425" lIns="91425" spcFirstLastPara="1" rIns="91425" wrap="square" tIns="91425">
+            <a:noAutofit/>
+          </a:bodyPr>
+          <a:lstStyle/>
+          <a:p>
+            <a:pPr indent="0" lvl="0" marL="0" rtl="0" algn="l">
+              <a:spcBef>
+                <a:spcPts val="0"/>
+              </a:spcBef>
+              <a:spcAft>
+                <a:spcPts val="0"/>
+              </a:spcAft>
+              <a:buNone/>
+            </a:pPr>
+            <a:r>
+              <a:t/>
+            </a:r>
+            <a:endParaRPr/>
+          </a:p>
+        </p:txBody>
+      </p:sp>
+      <p:sp>
+        <p:nvSpPr>
+          <p:cNvPr id="534" name="Google Shape;534;p60"/>
+          <p:cNvSpPr/>
+          <p:nvPr/>
+        </p:nvSpPr>
+        <p:spPr>
+          <a:xfrm>
+            <a:off x="178500" y="1542000"/>
+            <a:ext cx="3801900" cy="3218700"/>
+          </a:xfrm>
+          <a:prstGeom prst="rect">
+            <a:avLst/>
+          </a:prstGeom>
+          <a:solidFill>
+            <a:schemeClr val="lt1"/>
+          </a:solidFill>
+          <a:ln cap="flat" cmpd="sng" w="9525">
+            <a:solidFill>
+              <a:schemeClr val="dk2"/>
+            </a:solidFill>
+            <a:prstDash val="solid"/>
+            <a:round/>
+            <a:headEnd len="sm" w="sm" type="none"/>
+            <a:tailEnd len="sm" w="sm" type="none"/>
+          </a:ln>
+        </p:spPr>
+        <p:txBody>
+          <a:bodyPr anchorCtr="0" anchor="ctr" bIns="91425" lIns="91425" spcFirstLastPara="1" rIns="91425" wrap="square" tIns="91425">
+            <a:noAutofit/>
+          </a:bodyPr>
+          <a:lstStyle/>
+          <a:p>
+            <a:pPr indent="0" lvl="0" marL="0" rtl="0" algn="l">
+              <a:spcBef>
+                <a:spcPts val="0"/>
+              </a:spcBef>
+              <a:spcAft>
+                <a:spcPts val="0"/>
+              </a:spcAft>
+              <a:buNone/>
+            </a:pPr>
+            <a:r>
+              <a:t/>
+            </a:r>
+            <a:endParaRPr/>
+          </a:p>
+        </p:txBody>
+      </p:sp>
+      <p:sp>
+        <p:nvSpPr>
+          <p:cNvPr id="535" name="Google Shape;535;p60"/>
+          <p:cNvSpPr txBox="1"/>
+          <p:nvPr>
+            <p:ph type="ctrTitle"/>
+          </p:nvPr>
+        </p:nvSpPr>
+        <p:spPr>
+          <a:xfrm>
+            <a:off x="918900" y="618750"/>
+            <a:ext cx="7306200" cy="441000"/>
+          </a:xfrm>
+          <a:prstGeom prst="rect">
+            <a:avLst/>
+          </a:prstGeom>
+        </p:spPr>
+        <p:txBody>
+          <a:bodyPr anchorCtr="0" anchor="b" bIns="91425" lIns="91425" spcFirstLastPara="1" rIns="91425" wrap="square" tIns="91425">
+            <a:noAutofit/>
+          </a:bodyPr>
+          <a:lstStyle/>
+          <a:p>
+            <a:pPr indent="0" lvl="0" marL="0" rtl="0" algn="ctr">
+              <a:spcBef>
+                <a:spcPts val="0"/>
+              </a:spcBef>
+              <a:spcAft>
+                <a:spcPts val="0"/>
+              </a:spcAft>
+              <a:buSzPts val="990"/>
+              <a:buNone/>
+            </a:pPr>
+            <a:r>
+              <a:rPr b="1" lang="pt-BR" sz="2200"/>
+              <a:t>Ignorando arquivos de um determinado tipo</a:t>
+            </a:r>
+            <a:endParaRPr b="1" sz="2200"/>
+          </a:p>
+        </p:txBody>
+      </p:sp>
+      <p:sp>
+        <p:nvSpPr>
+          <p:cNvPr id="536" name="Google Shape;536;p60"/>
+          <p:cNvSpPr txBox="1"/>
+          <p:nvPr/>
+        </p:nvSpPr>
+        <p:spPr>
+          <a:xfrm>
+            <a:off x="5936450" y="198875"/>
+            <a:ext cx="3000000" cy="369300"/>
+          </a:xfrm>
+          <a:prstGeom prst="rect">
+            <a:avLst/>
+          </a:prstGeom>
+          <a:noFill/>
+          <a:ln>
+            <a:noFill/>
+          </a:ln>
+        </p:spPr>
+        <p:txBody>
+          <a:bodyPr anchorCtr="0" anchor="t" bIns="91425" lIns="91425" spcFirstLastPara="1" rIns="91425" wrap="square" tIns="91425">
+            <a:spAutoFit/>
+          </a:bodyPr>
+          <a:lstStyle/>
+          <a:p>
+            <a:pPr indent="0" lvl="0" marL="0" rtl="0" algn="ctr">
+              <a:spcBef>
+                <a:spcPts val="0"/>
+              </a:spcBef>
+              <a:spcAft>
+                <a:spcPts val="0"/>
+              </a:spcAft>
+              <a:buNone/>
+            </a:pPr>
+            <a:r>
+              <a:rPr b="1" lang="pt-BR" sz="1200">
+                <a:solidFill>
+                  <a:schemeClr val="dk1"/>
+                </a:solidFill>
+              </a:rPr>
+              <a:t>Módulo 9: gitignore</a:t>
+            </a:r>
+            <a:endParaRPr b="1" sz="1200">
+              <a:solidFill>
+                <a:schemeClr val="dk1"/>
+              </a:solidFill>
+            </a:endParaRPr>
+          </a:p>
+        </p:txBody>
+      </p:sp>
+      <p:pic>
+        <p:nvPicPr>
+          <p:cNvPr id="537" name="Google Shape;537;p60"/>
+          <p:cNvPicPr preferRelativeResize="0"/>
+          <p:nvPr/>
+        </p:nvPicPr>
+        <p:blipFill>
+          <a:blip r:embed="rId3">
+            <a:alphaModFix/>
+          </a:blip>
+          <a:stretch>
+            <a:fillRect/>
+          </a:stretch>
+        </p:blipFill>
+        <p:spPr>
+          <a:xfrm>
+            <a:off x="201757" y="1577310"/>
+            <a:ext cx="3755393" cy="3148252"/>
+          </a:xfrm>
+          <a:prstGeom prst="rect">
+            <a:avLst/>
+          </a:prstGeom>
+          <a:noFill/>
+          <a:ln>
+            <a:noFill/>
+          </a:ln>
+        </p:spPr>
+      </p:pic>
+      <p:pic>
+        <p:nvPicPr>
+          <p:cNvPr id="538" name="Google Shape;538;p60"/>
+          <p:cNvPicPr preferRelativeResize="0"/>
+          <p:nvPr/>
+        </p:nvPicPr>
+        <p:blipFill>
+          <a:blip r:embed="rId4">
+            <a:alphaModFix/>
+          </a:blip>
+          <a:stretch>
+            <a:fillRect/>
+          </a:stretch>
+        </p:blipFill>
+        <p:spPr>
+          <a:xfrm>
+            <a:off x="4133000" y="2126536"/>
+            <a:ext cx="4773900" cy="2049650"/>
           </a:xfrm>
           <a:prstGeom prst="rect">
             <a:avLst/>
@@ -21041,6 +23751,285 @@
 </file>
 
 <file path=ppt/theme/theme1.xml><?xml version="1.0" encoding="utf-8"?>
+<a:theme xmlns:a="http://schemas.openxmlformats.org/drawingml/2006/main" xmlns:r="http://schemas.openxmlformats.org/officeDocument/2006/relationships" name="Simple Light">
+  <a:themeElements>
+    <a:clrScheme name="Simple Light">
+      <a:dk1>
+        <a:srgbClr val="000000"/>
+      </a:dk1>
+      <a:lt1>
+        <a:srgbClr val="FFFFFF"/>
+      </a:lt1>
+      <a:dk2>
+        <a:srgbClr val="595959"/>
+      </a:dk2>
+      <a:lt2>
+        <a:srgbClr val="EEEEEE"/>
+      </a:lt2>
+      <a:accent1>
+        <a:srgbClr val="4285F4"/>
+      </a:accent1>
+      <a:accent2>
+        <a:srgbClr val="212121"/>
+      </a:accent2>
+      <a:accent3>
+        <a:srgbClr val="78909C"/>
+      </a:accent3>
+      <a:accent4>
+        <a:srgbClr val="FFAB40"/>
+      </a:accent4>
+      <a:accent5>
+        <a:srgbClr val="0097A7"/>
+      </a:accent5>
+      <a:accent6>
+        <a:srgbClr val="EEFF41"/>
+      </a:accent6>
+      <a:hlink>
+        <a:srgbClr val="0097A7"/>
+      </a:hlink>
+      <a:folHlink>
+        <a:srgbClr val="0097A7"/>
+      </a:folHlink>
+    </a:clrScheme>
+    <a:fontScheme name="Office">
+      <a:majorFont>
+        <a:latin typeface="Arial"/>
+        <a:ea typeface=""/>
+        <a:cs typeface=""/>
+        <a:font script="Jpan" typeface="ＭＳ Ｐゴシック"/>
+        <a:font script="Hang" typeface="맑은 고딕"/>
+        <a:font script="Hans" typeface="宋体"/>
+        <a:font script="Hant" typeface="新細明體"/>
+        <a:font script="Arab" typeface="Times New Roman"/>
+        <a:font script="Hebr" typeface="Times New Roman"/>
+        <a:font script="Thai" typeface="Angsana New"/>
+        <a:font script="Ethi" typeface="Nyala"/>
+        <a:font script="Beng" typeface="Vrinda"/>
+        <a:font script="Gujr" typeface="Shruti"/>
+        <a:font script="Khmr" typeface="MoolBoran"/>
+        <a:font script="Knda" typeface="Tunga"/>
+        <a:font script="Guru" typeface="Raavi"/>
+        <a:font script="Cans" typeface="Euphemia"/>
+        <a:font script="Cher" typeface="Plantagenet Cherokee"/>
+        <a:font script="Yiii" typeface="Microsoft Yi Baiti"/>
+        <a:font script="Tibt" typeface="Microsoft Himalaya"/>
+        <a:font script="Thaa" typeface="MV Boli"/>
+        <a:font script="Deva" typeface="Mangal"/>
+        <a:font script="Telu" typeface="Gautami"/>
+        <a:font script="Taml" typeface="Latha"/>
+        <a:font script="Syrc" typeface="Estrangelo Edessa"/>
+        <a:font script="Orya" typeface="Kalinga"/>
+        <a:font script="Mlym" typeface="Kartika"/>
+        <a:font script="Laoo" typeface="DokChampa"/>
+        <a:font script="Sinh" typeface="Iskoola Pota"/>
+        <a:font script="Mong" typeface="Mongolian Baiti"/>
+        <a:font script="Viet" typeface="Times New Roman"/>
+        <a:font script="Uigh" typeface="Microsoft Uighur"/>
+        <a:font script="Geor" typeface="Sylfaen"/>
+      </a:majorFont>
+      <a:minorFont>
+        <a:latin typeface="Arial"/>
+        <a:ea typeface=""/>
+        <a:cs typeface=""/>
+        <a:font script="Jpan" typeface="ＭＳ Ｐゴシック"/>
+        <a:font script="Hang" typeface="맑은 고딕"/>
+        <a:font script="Hans" typeface="宋体"/>
+        <a:font script="Hant" typeface="新細明體"/>
+        <a:font script="Arab" typeface="Arial"/>
+        <a:font script="Hebr" typeface="Arial"/>
+        <a:font script="Thai" typeface="Cordia New"/>
+        <a:font script="Ethi" typeface="Nyala"/>
+        <a:font script="Beng" typeface="Vrinda"/>
+        <a:font script="Gujr" typeface="Shruti"/>
+        <a:font script="Khmr" typeface="DaunPenh"/>
+        <a:font script="Knda" typeface="Tunga"/>
+        <a:font script="Guru" typeface="Raavi"/>
+        <a:font script="Cans" typeface="Euphemia"/>
+        <a:font script="Cher" typeface="Plantagenet Cherokee"/>
+        <a:font script="Yiii" typeface="Microsoft Yi Baiti"/>
+        <a:font script="Tibt" typeface="Microsoft Himalaya"/>
+        <a:font script="Thaa" typeface="MV Boli"/>
+        <a:font script="Deva" typeface="Mangal"/>
+        <a:font script="Telu" typeface="Gautami"/>
+        <a:font script="Taml" typeface="Latha"/>
+        <a:font script="Syrc" typeface="Estrangelo Edessa"/>
+        <a:font script="Orya" typeface="Kalinga"/>
+        <a:font script="Mlym" typeface="Kartika"/>
+        <a:font script="Laoo" typeface="DokChampa"/>
+        <a:font script="Sinh" typeface="Iskoola Pota"/>
+        <a:font script="Mong" typeface="Mongolian Baiti"/>
+        <a:font script="Viet" typeface="Arial"/>
+        <a:font script="Uigh" typeface="Microsoft Uighur"/>
+        <a:font script="Geor" typeface="Sylfaen"/>
+      </a:minorFont>
+    </a:fontScheme>
+    <a:fmtScheme name="Office">
+      <a:fillStyleLst>
+        <a:solidFill>
+          <a:schemeClr val="phClr"/>
+        </a:solidFill>
+        <a:gradFill rotWithShape="1">
+          <a:gsLst>
+            <a:gs pos="0">
+              <a:schemeClr val="phClr">
+                <a:tint val="50000"/>
+                <a:satMod val="300000"/>
+              </a:schemeClr>
+            </a:gs>
+            <a:gs pos="35000">
+              <a:schemeClr val="phClr">
+                <a:tint val="37000"/>
+                <a:satMod val="300000"/>
+              </a:schemeClr>
+            </a:gs>
+            <a:gs pos="100000">
+              <a:schemeClr val="phClr">
+                <a:tint val="15000"/>
+                <a:satMod val="350000"/>
+              </a:schemeClr>
+            </a:gs>
+          </a:gsLst>
+          <a:lin ang="16200000" scaled="1"/>
+        </a:gradFill>
+        <a:gradFill rotWithShape="1">
+          <a:gsLst>
+            <a:gs pos="0">
+              <a:schemeClr val="phClr">
+                <a:tint val="100000"/>
+                <a:shade val="100000"/>
+                <a:satMod val="130000"/>
+              </a:schemeClr>
+            </a:gs>
+            <a:gs pos="100000">
+              <a:schemeClr val="phClr">
+                <a:tint val="50000"/>
+                <a:shade val="100000"/>
+                <a:satMod val="350000"/>
+              </a:schemeClr>
+            </a:gs>
+          </a:gsLst>
+          <a:lin ang="16200000" scaled="0"/>
+        </a:gradFill>
+      </a:fillStyleLst>
+      <a:lnStyleLst>
+        <a:ln w="9525" cap="flat" cmpd="sng" algn="ctr">
+          <a:solidFill>
+            <a:schemeClr val="phClr">
+              <a:shade val="95000"/>
+              <a:satMod val="105000"/>
+            </a:schemeClr>
+          </a:solidFill>
+          <a:prstDash val="solid"/>
+        </a:ln>
+        <a:ln w="25400" cap="flat" cmpd="sng" algn="ctr">
+          <a:solidFill>
+            <a:schemeClr val="phClr"/>
+          </a:solidFill>
+          <a:prstDash val="solid"/>
+        </a:ln>
+        <a:ln w="38100" cap="flat" cmpd="sng" algn="ctr">
+          <a:solidFill>
+            <a:schemeClr val="phClr"/>
+          </a:solidFill>
+          <a:prstDash val="solid"/>
+        </a:ln>
+      </a:lnStyleLst>
+      <a:effectStyleLst>
+        <a:effectStyle>
+          <a:effectLst>
+            <a:outerShdw blurRad="40000" dist="20000" dir="5400000" rotWithShape="0">
+              <a:srgbClr val="000000">
+                <a:alpha val="38000"/>
+              </a:srgbClr>
+            </a:outerShdw>
+          </a:effectLst>
+        </a:effectStyle>
+        <a:effectStyle>
+          <a:effectLst>
+            <a:outerShdw blurRad="40000" dist="23000" dir="5400000" rotWithShape="0">
+              <a:srgbClr val="000000">
+                <a:alpha val="35000"/>
+              </a:srgbClr>
+            </a:outerShdw>
+          </a:effectLst>
+        </a:effectStyle>
+        <a:effectStyle>
+          <a:effectLst>
+            <a:outerShdw blurRad="40000" dist="23000" dir="5400000" rotWithShape="0">
+              <a:srgbClr val="000000">
+                <a:alpha val="35000"/>
+              </a:srgbClr>
+            </a:outerShdw>
+          </a:effectLst>
+          <a:scene3d>
+            <a:camera prst="orthographicFront">
+              <a:rot lat="0" lon="0" rev="0"/>
+            </a:camera>
+            <a:lightRig rig="threePt" dir="t">
+              <a:rot lat="0" lon="0" rev="1200000"/>
+            </a:lightRig>
+          </a:scene3d>
+          <a:sp3d>
+            <a:bevelT w="63500" h="25400"/>
+          </a:sp3d>
+        </a:effectStyle>
+      </a:effectStyleLst>
+      <a:bgFillStyleLst>
+        <a:solidFill>
+          <a:schemeClr val="phClr"/>
+        </a:solidFill>
+        <a:gradFill rotWithShape="1">
+          <a:gsLst>
+            <a:gs pos="0">
+              <a:schemeClr val="phClr">
+                <a:tint val="40000"/>
+                <a:satMod val="350000"/>
+              </a:schemeClr>
+            </a:gs>
+            <a:gs pos="40000">
+              <a:schemeClr val="phClr">
+                <a:tint val="45000"/>
+                <a:shade val="99000"/>
+                <a:satMod val="350000"/>
+              </a:schemeClr>
+            </a:gs>
+            <a:gs pos="100000">
+              <a:schemeClr val="phClr">
+                <a:shade val="20000"/>
+                <a:satMod val="255000"/>
+              </a:schemeClr>
+            </a:gs>
+          </a:gsLst>
+          <a:path path="circle">
+            <a:fillToRect l="50000" t="-80000" r="50000" b="180000"/>
+          </a:path>
+        </a:gradFill>
+        <a:gradFill rotWithShape="1">
+          <a:gsLst>
+            <a:gs pos="0">
+              <a:schemeClr val="phClr">
+                <a:tint val="80000"/>
+                <a:satMod val="300000"/>
+              </a:schemeClr>
+            </a:gs>
+            <a:gs pos="100000">
+              <a:schemeClr val="phClr">
+                <a:shade val="30000"/>
+                <a:satMod val="200000"/>
+              </a:schemeClr>
+            </a:gs>
+          </a:gsLst>
+          <a:path path="circle">
+            <a:fillToRect l="50000" t="50000" r="50000" b="50000"/>
+          </a:path>
+        </a:gradFill>
+      </a:bgFillStyleLst>
+    </a:fmtScheme>
+  </a:themeElements>
+</a:theme>
+</file>
+
+<file path=ppt/theme/theme2.xml><?xml version="1.0" encoding="utf-8"?>
 <a:theme xmlns:a="http://schemas.openxmlformats.org/drawingml/2006/main" xmlns:r="http://schemas.openxmlformats.org/officeDocument/2006/relationships">
   <a:themeElements>
     <a:clrScheme name="Default">
@@ -21317,283 +24306,4 @@
     </a:fmtScheme>
   </a:themeElements>
 </a:theme>
-</file>
-
-<file path=ppt/theme/theme2.xml><?xml version="1.0" encoding="utf-8"?>
-<a:theme xmlns:a="http://schemas.openxmlformats.org/drawingml/2006/main" xmlns:r="http://schemas.openxmlformats.org/officeDocument/2006/relationships" name="Simple Light">
-  <a:themeElements>
-    <a:clrScheme name="Simple Light">
-      <a:dk1>
-        <a:srgbClr val="000000"/>
-      </a:dk1>
-      <a:lt1>
-        <a:srgbClr val="FFFFFF"/>
-      </a:lt1>
-      <a:dk2>
-        <a:srgbClr val="595959"/>
-      </a:dk2>
-      <a:lt2>
-        <a:srgbClr val="EEEEEE"/>
-      </a:lt2>
-      <a:accent1>
-        <a:srgbClr val="4285F4"/>
-      </a:accent1>
-      <a:accent2>
-        <a:srgbClr val="212121"/>
-      </a:accent2>
-      <a:accent3>
-        <a:srgbClr val="78909C"/>
-      </a:accent3>
-      <a:accent4>
-        <a:srgbClr val="FFAB40"/>
-      </a:accent4>
-      <a:accent5>
-        <a:srgbClr val="0097A7"/>
-      </a:accent5>
-      <a:accent6>
-        <a:srgbClr val="EEFF41"/>
-      </a:accent6>
-      <a:hlink>
-        <a:srgbClr val="0097A7"/>
-      </a:hlink>
-      <a:folHlink>
-        <a:srgbClr val="0097A7"/>
-      </a:folHlink>
-    </a:clrScheme>
-    <a:fontScheme name="Office">
-      <a:majorFont>
-        <a:latin typeface="Arial"/>
-        <a:ea typeface=""/>
-        <a:cs typeface=""/>
-        <a:font script="Jpan" typeface="ＭＳ Ｐゴシック"/>
-        <a:font script="Hang" typeface="맑은 고딕"/>
-        <a:font script="Hans" typeface="宋体"/>
-        <a:font script="Hant" typeface="新細明體"/>
-        <a:font script="Arab" typeface="Times New Roman"/>
-        <a:font script="Hebr" typeface="Times New Roman"/>
-        <a:font script="Thai" typeface="Angsana New"/>
-        <a:font script="Ethi" typeface="Nyala"/>
-        <a:font script="Beng" typeface="Vrinda"/>
-        <a:font script="Gujr" typeface="Shruti"/>
-        <a:font script="Khmr" typeface="MoolBoran"/>
-        <a:font script="Knda" typeface="Tunga"/>
-        <a:font script="Guru" typeface="Raavi"/>
-        <a:font script="Cans" typeface="Euphemia"/>
-        <a:font script="Cher" typeface="Plantagenet Cherokee"/>
-        <a:font script="Yiii" typeface="Microsoft Yi Baiti"/>
-        <a:font script="Tibt" typeface="Microsoft Himalaya"/>
-        <a:font script="Thaa" typeface="MV Boli"/>
-        <a:font script="Deva" typeface="Mangal"/>
-        <a:font script="Telu" typeface="Gautami"/>
-        <a:font script="Taml" typeface="Latha"/>
-        <a:font script="Syrc" typeface="Estrangelo Edessa"/>
-        <a:font script="Orya" typeface="Kalinga"/>
-        <a:font script="Mlym" typeface="Kartika"/>
-        <a:font script="Laoo" typeface="DokChampa"/>
-        <a:font script="Sinh" typeface="Iskoola Pota"/>
-        <a:font script="Mong" typeface="Mongolian Baiti"/>
-        <a:font script="Viet" typeface="Times New Roman"/>
-        <a:font script="Uigh" typeface="Microsoft Uighur"/>
-        <a:font script="Geor" typeface="Sylfaen"/>
-      </a:majorFont>
-      <a:minorFont>
-        <a:latin typeface="Arial"/>
-        <a:ea typeface=""/>
-        <a:cs typeface=""/>
-        <a:font script="Jpan" typeface="ＭＳ Ｐゴシック"/>
-        <a:font script="Hang" typeface="맑은 고딕"/>
-        <a:font script="Hans" typeface="宋体"/>
-        <a:font script="Hant" typeface="新細明體"/>
-        <a:font script="Arab" typeface="Arial"/>
-        <a:font script="Hebr" typeface="Arial"/>
-        <a:font script="Thai" typeface="Cordia New"/>
-        <a:font script="Ethi" typeface="Nyala"/>
-        <a:font script="Beng" typeface="Vrinda"/>
-        <a:font script="Gujr" typeface="Shruti"/>
-        <a:font script="Khmr" typeface="DaunPenh"/>
-        <a:font script="Knda" typeface="Tunga"/>
-        <a:font script="Guru" typeface="Raavi"/>
-        <a:font script="Cans" typeface="Euphemia"/>
-        <a:font script="Cher" typeface="Plantagenet Cherokee"/>
-        <a:font script="Yiii" typeface="Microsoft Yi Baiti"/>
-        <a:font script="Tibt" typeface="Microsoft Himalaya"/>
-        <a:font script="Thaa" typeface="MV Boli"/>
-        <a:font script="Deva" typeface="Mangal"/>
-        <a:font script="Telu" typeface="Gautami"/>
-        <a:font script="Taml" typeface="Latha"/>
-        <a:font script="Syrc" typeface="Estrangelo Edessa"/>
-        <a:font script="Orya" typeface="Kalinga"/>
-        <a:font script="Mlym" typeface="Kartika"/>
-        <a:font script="Laoo" typeface="DokChampa"/>
-        <a:font script="Sinh" typeface="Iskoola Pota"/>
-        <a:font script="Mong" typeface="Mongolian Baiti"/>
-        <a:font script="Viet" typeface="Arial"/>
-        <a:font script="Uigh" typeface="Microsoft Uighur"/>
-        <a:font script="Geor" typeface="Sylfaen"/>
-      </a:minorFont>
-    </a:fontScheme>
-    <a:fmtScheme name="Office">
-      <a:fillStyleLst>
-        <a:solidFill>
-          <a:schemeClr val="phClr"/>
-        </a:solidFill>
-        <a:gradFill rotWithShape="1">
-          <a:gsLst>
-            <a:gs pos="0">
-              <a:schemeClr val="phClr">
-                <a:tint val="50000"/>
-                <a:satMod val="300000"/>
-              </a:schemeClr>
-            </a:gs>
-            <a:gs pos="35000">
-              <a:schemeClr val="phClr">
-                <a:tint val="37000"/>
-                <a:satMod val="300000"/>
-              </a:schemeClr>
-            </a:gs>
-            <a:gs pos="100000">
-              <a:schemeClr val="phClr">
-                <a:tint val="15000"/>
-                <a:satMod val="350000"/>
-              </a:schemeClr>
-            </a:gs>
-          </a:gsLst>
-          <a:lin ang="16200000" scaled="1"/>
-        </a:gradFill>
-        <a:gradFill rotWithShape="1">
-          <a:gsLst>
-            <a:gs pos="0">
-              <a:schemeClr val="phClr">
-                <a:tint val="100000"/>
-                <a:shade val="100000"/>
-                <a:satMod val="130000"/>
-              </a:schemeClr>
-            </a:gs>
-            <a:gs pos="100000">
-              <a:schemeClr val="phClr">
-                <a:tint val="50000"/>
-                <a:shade val="100000"/>
-                <a:satMod val="350000"/>
-              </a:schemeClr>
-            </a:gs>
-          </a:gsLst>
-          <a:lin ang="16200000" scaled="0"/>
-        </a:gradFill>
-      </a:fillStyleLst>
-      <a:lnStyleLst>
-        <a:ln w="9525" cap="flat" cmpd="sng" algn="ctr">
-          <a:solidFill>
-            <a:schemeClr val="phClr">
-              <a:shade val="95000"/>
-              <a:satMod val="105000"/>
-            </a:schemeClr>
-          </a:solidFill>
-          <a:prstDash val="solid"/>
-        </a:ln>
-        <a:ln w="25400" cap="flat" cmpd="sng" algn="ctr">
-          <a:solidFill>
-            <a:schemeClr val="phClr"/>
-          </a:solidFill>
-          <a:prstDash val="solid"/>
-        </a:ln>
-        <a:ln w="38100" cap="flat" cmpd="sng" algn="ctr">
-          <a:solidFill>
-            <a:schemeClr val="phClr"/>
-          </a:solidFill>
-          <a:prstDash val="solid"/>
-        </a:ln>
-      </a:lnStyleLst>
-      <a:effectStyleLst>
-        <a:effectStyle>
-          <a:effectLst>
-            <a:outerShdw blurRad="40000" dist="20000" dir="5400000" rotWithShape="0">
-              <a:srgbClr val="000000">
-                <a:alpha val="38000"/>
-              </a:srgbClr>
-            </a:outerShdw>
-          </a:effectLst>
-        </a:effectStyle>
-        <a:effectStyle>
-          <a:effectLst>
-            <a:outerShdw blurRad="40000" dist="23000" dir="5400000" rotWithShape="0">
-              <a:srgbClr val="000000">
-                <a:alpha val="35000"/>
-              </a:srgbClr>
-            </a:outerShdw>
-          </a:effectLst>
-        </a:effectStyle>
-        <a:effectStyle>
-          <a:effectLst>
-            <a:outerShdw blurRad="40000" dist="23000" dir="5400000" rotWithShape="0">
-              <a:srgbClr val="000000">
-                <a:alpha val="35000"/>
-              </a:srgbClr>
-            </a:outerShdw>
-          </a:effectLst>
-          <a:scene3d>
-            <a:camera prst="orthographicFront">
-              <a:rot lat="0" lon="0" rev="0"/>
-            </a:camera>
-            <a:lightRig rig="threePt" dir="t">
-              <a:rot lat="0" lon="0" rev="1200000"/>
-            </a:lightRig>
-          </a:scene3d>
-          <a:sp3d>
-            <a:bevelT w="63500" h="25400"/>
-          </a:sp3d>
-        </a:effectStyle>
-      </a:effectStyleLst>
-      <a:bgFillStyleLst>
-        <a:solidFill>
-          <a:schemeClr val="phClr"/>
-        </a:solidFill>
-        <a:gradFill rotWithShape="1">
-          <a:gsLst>
-            <a:gs pos="0">
-              <a:schemeClr val="phClr">
-                <a:tint val="40000"/>
-                <a:satMod val="350000"/>
-              </a:schemeClr>
-            </a:gs>
-            <a:gs pos="40000">
-              <a:schemeClr val="phClr">
-                <a:tint val="45000"/>
-                <a:shade val="99000"/>
-                <a:satMod val="350000"/>
-              </a:schemeClr>
-            </a:gs>
-            <a:gs pos="100000">
-              <a:schemeClr val="phClr">
-                <a:shade val="20000"/>
-                <a:satMod val="255000"/>
-              </a:schemeClr>
-            </a:gs>
-          </a:gsLst>
-          <a:path path="circle">
-            <a:fillToRect l="50000" t="-80000" r="50000" b="180000"/>
-          </a:path>
-        </a:gradFill>
-        <a:gradFill rotWithShape="1">
-          <a:gsLst>
-            <a:gs pos="0">
-              <a:schemeClr val="phClr">
-                <a:tint val="80000"/>
-                <a:satMod val="300000"/>
-              </a:schemeClr>
-            </a:gs>
-            <a:gs pos="100000">
-              <a:schemeClr val="phClr">
-                <a:shade val="30000"/>
-                <a:satMod val="200000"/>
-              </a:schemeClr>
-            </a:gs>
-          </a:gsLst>
-          <a:path path="circle">
-            <a:fillToRect l="50000" t="50000" r="50000" b="50000"/>
-          </a:path>
-        </a:gradFill>
-      </a:bgFillStyleLst>
-    </a:fmtScheme>
-  </a:themeElements>
-</a:theme>
 </file>
</xml_diff>